<commit_message>
Minor edit to last slide
</commit_message>
<xml_diff>
--- a/Course project.pptx
+++ b/Course project.pptx
@@ -1,6 +1,6 @@
 
 <file path=ppt/presentation.xml><?xml version="1.0" encoding="utf-8"?>
-<p:presentation xmlns:a="http://schemas.openxmlformats.org/drawingml/2006/main" xmlns:r="http://schemas.openxmlformats.org/officeDocument/2006/relationships" xmlns:p="http://schemas.openxmlformats.org/presentationml/2006/main" autoCompressPictures="0">
+<p:presentation xmlns:a="http://schemas.openxmlformats.org/drawingml/2006/main" xmlns:r="http://schemas.openxmlformats.org/officeDocument/2006/relationships" xmlns:p="http://schemas.openxmlformats.org/presentationml/2006/main" saveSubsetFonts="1" autoCompressPictures="0">
   <p:sldMasterIdLst>
     <p:sldMasterId id="2147483648" r:id="rId1"/>
   </p:sldMasterIdLst>
@@ -112,6 +112,11 @@
       </a:defRPr>
     </a:lvl9pPr>
   </p:defaultTextStyle>
+  <p:extLst>
+    <p:ext uri="{EFAFB233-063F-42B5-8137-9DF3F51BA10A}">
+      <p15:sldGuideLst xmlns:p15="http://schemas.microsoft.com/office/powerpoint/2012/main"/>
+    </p:ext>
+  </p:extLst>
 </p:presentation>
 </file>
 
@@ -172,7 +177,7 @@
           <a:noFill/>
           <a:extLst>
             <a:ext uri="{909E8E84-426E-40dd-AFC4-6F175D3DCCD1}">
-              <a14:hiddenFill xmlns:a14="http://schemas.microsoft.com/office/drawing/2010/main" xmlns="">
+              <a14:hiddenFill xmlns="" xmlns:a14="http://schemas.microsoft.com/office/drawing/2010/main">
                 <a:solidFill>
                   <a:srgbClr val="FFFFFF"/>
                 </a:solidFill>
@@ -231,7 +236,7 @@
             </a:ln>
             <a:extLst>
               <a:ext uri="{91240B29-F687-4f45-9708-019B960494DF}">
-                <a14:hiddenLine xmlns:a14="http://schemas.microsoft.com/office/drawing/2010/main" xmlns="" w="9525">
+                <a14:hiddenLine xmlns="" xmlns:a14="http://schemas.microsoft.com/office/drawing/2010/main" w="9525">
                   <a:solidFill>
                     <a:srgbClr val="000000"/>
                   </a:solidFill>
@@ -321,7 +326,7 @@
             </a:ln>
             <a:extLst>
               <a:ext uri="{91240B29-F687-4f45-9708-019B960494DF}">
-                <a14:hiddenLine xmlns:a14="http://schemas.microsoft.com/office/drawing/2010/main" xmlns="" w="9525">
+                <a14:hiddenLine xmlns="" xmlns:a14="http://schemas.microsoft.com/office/drawing/2010/main" w="9525">
                   <a:solidFill>
                     <a:srgbClr val="000000"/>
                   </a:solidFill>
@@ -411,7 +416,7 @@
             </a:ln>
             <a:extLst>
               <a:ext uri="{91240B29-F687-4f45-9708-019B960494DF}">
-                <a14:hiddenLine xmlns:a14="http://schemas.microsoft.com/office/drawing/2010/main" xmlns="" w="9525">
+                <a14:hiddenLine xmlns="" xmlns:a14="http://schemas.microsoft.com/office/drawing/2010/main" w="9525">
                   <a:solidFill>
                     <a:srgbClr val="000000"/>
                   </a:solidFill>
@@ -445,7 +450,7 @@
             </a:ln>
             <a:extLst>
               <a:ext uri="{91240B29-F687-4f45-9708-019B960494DF}">
-                <a14:hiddenLine xmlns:a14="http://schemas.microsoft.com/office/drawing/2010/main" xmlns="" w="9525">
+                <a14:hiddenLine xmlns="" xmlns:a14="http://schemas.microsoft.com/office/drawing/2010/main" w="9525">
                   <a:solidFill>
                     <a:srgbClr val="000000"/>
                   </a:solidFill>
@@ -535,7 +540,7 @@
             </a:ln>
             <a:extLst>
               <a:ext uri="{91240B29-F687-4f45-9708-019B960494DF}">
-                <a14:hiddenLine xmlns:a14="http://schemas.microsoft.com/office/drawing/2010/main" xmlns="" w="9525">
+                <a14:hiddenLine xmlns="" xmlns:a14="http://schemas.microsoft.com/office/drawing/2010/main" w="9525">
                   <a:solidFill>
                     <a:srgbClr val="000000"/>
                   </a:solidFill>
@@ -597,7 +602,7 @@
             </a:ln>
             <a:extLst>
               <a:ext uri="{91240B29-F687-4f45-9708-019B960494DF}">
-                <a14:hiddenLine xmlns:a14="http://schemas.microsoft.com/office/drawing/2010/main" xmlns="" w="9525">
+                <a14:hiddenLine xmlns="" xmlns:a14="http://schemas.microsoft.com/office/drawing/2010/main" w="9525">
                   <a:solidFill>
                     <a:srgbClr val="000000"/>
                   </a:solidFill>
@@ -659,7 +664,7 @@
             </a:ln>
             <a:extLst>
               <a:ext uri="{91240B29-F687-4f45-9708-019B960494DF}">
-                <a14:hiddenLine xmlns:a14="http://schemas.microsoft.com/office/drawing/2010/main" xmlns="" w="9525">
+                <a14:hiddenLine xmlns="" xmlns:a14="http://schemas.microsoft.com/office/drawing/2010/main" w="9525">
                   <a:solidFill>
                     <a:srgbClr val="000000"/>
                   </a:solidFill>
@@ -749,7 +754,7 @@
             </a:ln>
             <a:extLst>
               <a:ext uri="{91240B29-F687-4f45-9708-019B960494DF}">
-                <a14:hiddenLine xmlns:a14="http://schemas.microsoft.com/office/drawing/2010/main" xmlns="" w="9525">
+                <a14:hiddenLine xmlns="" xmlns:a14="http://schemas.microsoft.com/office/drawing/2010/main" w="9525">
                   <a:solidFill>
                     <a:srgbClr val="000000"/>
                   </a:solidFill>
@@ -811,7 +816,7 @@
             </a:ln>
             <a:extLst>
               <a:ext uri="{91240B29-F687-4f45-9708-019B960494DF}">
-                <a14:hiddenLine xmlns:a14="http://schemas.microsoft.com/office/drawing/2010/main" xmlns="" w="9525">
+                <a14:hiddenLine xmlns="" xmlns:a14="http://schemas.microsoft.com/office/drawing/2010/main" w="9525">
                   <a:solidFill>
                     <a:srgbClr val="000000"/>
                   </a:solidFill>
@@ -873,7 +878,7 @@
             </a:ln>
             <a:extLst>
               <a:ext uri="{91240B29-F687-4f45-9708-019B960494DF}">
-                <a14:hiddenLine xmlns:a14="http://schemas.microsoft.com/office/drawing/2010/main" xmlns="" w="9525">
+                <a14:hiddenLine xmlns="" xmlns:a14="http://schemas.microsoft.com/office/drawing/2010/main" w="9525">
                   <a:solidFill>
                     <a:srgbClr val="000000"/>
                   </a:solidFill>
@@ -963,7 +968,7 @@
             </a:ln>
             <a:extLst>
               <a:ext uri="{91240B29-F687-4f45-9708-019B960494DF}">
-                <a14:hiddenLine xmlns:a14="http://schemas.microsoft.com/office/drawing/2010/main" xmlns="" w="9525">
+                <a14:hiddenLine xmlns="" xmlns:a14="http://schemas.microsoft.com/office/drawing/2010/main" w="9525">
                   <a:solidFill>
                     <a:srgbClr val="000000"/>
                   </a:solidFill>
@@ -1053,7 +1058,7 @@
             </a:ln>
             <a:extLst>
               <a:ext uri="{91240B29-F687-4f45-9708-019B960494DF}">
-                <a14:hiddenLine xmlns:a14="http://schemas.microsoft.com/office/drawing/2010/main" xmlns="" w="9525">
+                <a14:hiddenLine xmlns="" xmlns:a14="http://schemas.microsoft.com/office/drawing/2010/main" w="9525">
                   <a:solidFill>
                     <a:srgbClr val="000000"/>
                   </a:solidFill>
@@ -1115,7 +1120,7 @@
             </a:ln>
             <a:extLst>
               <a:ext uri="{91240B29-F687-4f45-9708-019B960494DF}">
-                <a14:hiddenLine xmlns:a14="http://schemas.microsoft.com/office/drawing/2010/main" xmlns="" w="9525">
+                <a14:hiddenLine xmlns="" xmlns:a14="http://schemas.microsoft.com/office/drawing/2010/main" w="9525">
                   <a:solidFill>
                     <a:srgbClr val="000000"/>
                   </a:solidFill>
@@ -1225,7 +1230,7 @@
             </a:ln>
             <a:extLst>
               <a:ext uri="{91240B29-F687-4f45-9708-019B960494DF}">
-                <a14:hiddenLine xmlns:a14="http://schemas.microsoft.com/office/drawing/2010/main" xmlns="" w="9525">
+                <a14:hiddenLine xmlns="" xmlns:a14="http://schemas.microsoft.com/office/drawing/2010/main" w="9525">
                   <a:solidFill>
                     <a:srgbClr val="000000"/>
                   </a:solidFill>
@@ -1287,7 +1292,7 @@
             </a:ln>
             <a:extLst>
               <a:ext uri="{91240B29-F687-4f45-9708-019B960494DF}">
-                <a14:hiddenLine xmlns:a14="http://schemas.microsoft.com/office/drawing/2010/main" xmlns="" w="9525">
+                <a14:hiddenLine xmlns="" xmlns:a14="http://schemas.microsoft.com/office/drawing/2010/main" w="9525">
                   <a:solidFill>
                     <a:srgbClr val="000000"/>
                   </a:solidFill>
@@ -1377,7 +1382,7 @@
             </a:ln>
             <a:extLst>
               <a:ext uri="{91240B29-F687-4f45-9708-019B960494DF}">
-                <a14:hiddenLine xmlns:a14="http://schemas.microsoft.com/office/drawing/2010/main" xmlns="" w="9525">
+                <a14:hiddenLine xmlns="" xmlns:a14="http://schemas.microsoft.com/office/drawing/2010/main" w="9525">
                   <a:solidFill>
                     <a:srgbClr val="000000"/>
                   </a:solidFill>
@@ -1467,7 +1472,7 @@
             </a:ln>
             <a:extLst>
               <a:ext uri="{91240B29-F687-4f45-9708-019B960494DF}">
-                <a14:hiddenLine xmlns:a14="http://schemas.microsoft.com/office/drawing/2010/main" xmlns="" w="9525">
+                <a14:hiddenLine xmlns="" xmlns:a14="http://schemas.microsoft.com/office/drawing/2010/main" w="9525">
                   <a:solidFill>
                     <a:srgbClr val="000000"/>
                   </a:solidFill>
@@ -1529,7 +1534,7 @@
             </a:ln>
             <a:extLst>
               <a:ext uri="{91240B29-F687-4f45-9708-019B960494DF}">
-                <a14:hiddenLine xmlns:a14="http://schemas.microsoft.com/office/drawing/2010/main" xmlns="" w="9525">
+                <a14:hiddenLine xmlns="" xmlns:a14="http://schemas.microsoft.com/office/drawing/2010/main" w="9525">
                   <a:solidFill>
                     <a:srgbClr val="000000"/>
                   </a:solidFill>
@@ -1619,7 +1624,7 @@
             </a:ln>
             <a:extLst>
               <a:ext uri="{91240B29-F687-4f45-9708-019B960494DF}">
-                <a14:hiddenLine xmlns:a14="http://schemas.microsoft.com/office/drawing/2010/main" xmlns="" w="9525">
+                <a14:hiddenLine xmlns="" xmlns:a14="http://schemas.microsoft.com/office/drawing/2010/main" w="9525">
                   <a:solidFill>
                     <a:srgbClr val="000000"/>
                   </a:solidFill>
@@ -1709,7 +1714,7 @@
             </a:ln>
             <a:extLst>
               <a:ext uri="{91240B29-F687-4f45-9708-019B960494DF}">
-                <a14:hiddenLine xmlns:a14="http://schemas.microsoft.com/office/drawing/2010/main" xmlns="" w="9525">
+                <a14:hiddenLine xmlns="" xmlns:a14="http://schemas.microsoft.com/office/drawing/2010/main" w="9525">
                   <a:solidFill>
                     <a:srgbClr val="000000"/>
                   </a:solidFill>
@@ -1765,7 +1770,7 @@
             </a:ln>
             <a:extLst>
               <a:ext uri="{91240B29-F687-4f45-9708-019B960494DF}">
-                <a14:hiddenLine xmlns:a14="http://schemas.microsoft.com/office/drawing/2010/main" xmlns="" w="9525">
+                <a14:hiddenLine xmlns="" xmlns:a14="http://schemas.microsoft.com/office/drawing/2010/main" w="9525">
                   <a:solidFill>
                     <a:srgbClr val="000000"/>
                   </a:solidFill>
@@ -1855,7 +1860,7 @@
             </a:ln>
             <a:extLst>
               <a:ext uri="{91240B29-F687-4f45-9708-019B960494DF}">
-                <a14:hiddenLine xmlns:a14="http://schemas.microsoft.com/office/drawing/2010/main" xmlns="" w="9525">
+                <a14:hiddenLine xmlns="" xmlns:a14="http://schemas.microsoft.com/office/drawing/2010/main" w="9525">
                   <a:solidFill>
                     <a:srgbClr val="000000"/>
                   </a:solidFill>
@@ -1911,7 +1916,7 @@
             </a:ln>
             <a:extLst>
               <a:ext uri="{91240B29-F687-4f45-9708-019B960494DF}">
-                <a14:hiddenLine xmlns:a14="http://schemas.microsoft.com/office/drawing/2010/main" xmlns="" w="9525">
+                <a14:hiddenLine xmlns="" xmlns:a14="http://schemas.microsoft.com/office/drawing/2010/main" w="9525">
                   <a:solidFill>
                     <a:srgbClr val="000000"/>
                   </a:solidFill>
@@ -2001,7 +2006,7 @@
             </a:ln>
             <a:extLst>
               <a:ext uri="{91240B29-F687-4f45-9708-019B960494DF}">
-                <a14:hiddenLine xmlns:a14="http://schemas.microsoft.com/office/drawing/2010/main" xmlns="" w="9525">
+                <a14:hiddenLine xmlns="" xmlns:a14="http://schemas.microsoft.com/office/drawing/2010/main" w="9525">
                   <a:solidFill>
                     <a:srgbClr val="000000"/>
                   </a:solidFill>
@@ -2069,7 +2074,7 @@
             </a:ln>
             <a:extLst>
               <a:ext uri="{91240B29-F687-4f45-9708-019B960494DF}">
-                <a14:hiddenLine xmlns:a14="http://schemas.microsoft.com/office/drawing/2010/main" xmlns="" w="9525">
+                <a14:hiddenLine xmlns="" xmlns:a14="http://schemas.microsoft.com/office/drawing/2010/main" w="9525">
                   <a:solidFill>
                     <a:srgbClr val="000000"/>
                   </a:solidFill>
@@ -2159,7 +2164,7 @@
             </a:ln>
             <a:extLst>
               <a:ext uri="{91240B29-F687-4f45-9708-019B960494DF}">
-                <a14:hiddenLine xmlns:a14="http://schemas.microsoft.com/office/drawing/2010/main" xmlns="" w="9525">
+                <a14:hiddenLine xmlns="" xmlns:a14="http://schemas.microsoft.com/office/drawing/2010/main" w="9525">
                   <a:solidFill>
                     <a:srgbClr val="000000"/>
                   </a:solidFill>
@@ -2227,7 +2232,7 @@
             </a:ln>
             <a:extLst>
               <a:ext uri="{91240B29-F687-4f45-9708-019B960494DF}">
-                <a14:hiddenLine xmlns:a14="http://schemas.microsoft.com/office/drawing/2010/main" xmlns="" w="9525">
+                <a14:hiddenLine xmlns="" xmlns:a14="http://schemas.microsoft.com/office/drawing/2010/main" w="9525">
                   <a:solidFill>
                     <a:srgbClr val="000000"/>
                   </a:solidFill>
@@ -2317,7 +2322,7 @@
             </a:ln>
             <a:extLst>
               <a:ext uri="{91240B29-F687-4f45-9708-019B960494DF}">
-                <a14:hiddenLine xmlns:a14="http://schemas.microsoft.com/office/drawing/2010/main" xmlns="" w="9525">
+                <a14:hiddenLine xmlns="" xmlns:a14="http://schemas.microsoft.com/office/drawing/2010/main" w="9525">
                   <a:solidFill>
                     <a:srgbClr val="000000"/>
                   </a:solidFill>
@@ -2351,7 +2356,7 @@
             </a:ln>
             <a:extLst>
               <a:ext uri="{91240B29-F687-4f45-9708-019B960494DF}">
-                <a14:hiddenLine xmlns:a14="http://schemas.microsoft.com/office/drawing/2010/main" xmlns="" w="9525">
+                <a14:hiddenLine xmlns="" xmlns:a14="http://schemas.microsoft.com/office/drawing/2010/main" w="9525">
                   <a:solidFill>
                     <a:srgbClr val="000000"/>
                   </a:solidFill>
@@ -2441,7 +2446,7 @@
             </a:ln>
             <a:extLst>
               <a:ext uri="{91240B29-F687-4f45-9708-019B960494DF}">
-                <a14:hiddenLine xmlns:a14="http://schemas.microsoft.com/office/drawing/2010/main" xmlns="" w="9525">
+                <a14:hiddenLine xmlns="" xmlns:a14="http://schemas.microsoft.com/office/drawing/2010/main" w="9525">
                   <a:solidFill>
                     <a:srgbClr val="000000"/>
                   </a:solidFill>
@@ -2503,7 +2508,7 @@
             </a:ln>
             <a:extLst>
               <a:ext uri="{91240B29-F687-4f45-9708-019B960494DF}">
-                <a14:hiddenLine xmlns:a14="http://schemas.microsoft.com/office/drawing/2010/main" xmlns="" w="9525">
+                <a14:hiddenLine xmlns="" xmlns:a14="http://schemas.microsoft.com/office/drawing/2010/main" w="9525">
                   <a:solidFill>
                     <a:srgbClr val="000000"/>
                   </a:solidFill>
@@ -2565,7 +2570,7 @@
             </a:ln>
             <a:extLst>
               <a:ext uri="{91240B29-F687-4f45-9708-019B960494DF}">
-                <a14:hiddenLine xmlns:a14="http://schemas.microsoft.com/office/drawing/2010/main" xmlns="" w="9525">
+                <a14:hiddenLine xmlns="" xmlns:a14="http://schemas.microsoft.com/office/drawing/2010/main" w="9525">
                   <a:solidFill>
                     <a:srgbClr val="000000"/>
                   </a:solidFill>
@@ -2655,7 +2660,7 @@
             </a:ln>
             <a:extLst>
               <a:ext uri="{91240B29-F687-4f45-9708-019B960494DF}">
-                <a14:hiddenLine xmlns:a14="http://schemas.microsoft.com/office/drawing/2010/main" xmlns="" w="9525">
+                <a14:hiddenLine xmlns="" xmlns:a14="http://schemas.microsoft.com/office/drawing/2010/main" w="9525">
                   <a:solidFill>
                     <a:srgbClr val="000000"/>
                   </a:solidFill>
@@ -2723,7 +2728,7 @@
             </a:ln>
             <a:extLst>
               <a:ext uri="{91240B29-F687-4f45-9708-019B960494DF}">
-                <a14:hiddenLine xmlns:a14="http://schemas.microsoft.com/office/drawing/2010/main" xmlns="" w="9525">
+                <a14:hiddenLine xmlns="" xmlns:a14="http://schemas.microsoft.com/office/drawing/2010/main" w="9525">
                   <a:solidFill>
                     <a:srgbClr val="000000"/>
                   </a:solidFill>
@@ -2785,7 +2790,7 @@
             </a:ln>
             <a:extLst>
               <a:ext uri="{91240B29-F687-4f45-9708-019B960494DF}">
-                <a14:hiddenLine xmlns:a14="http://schemas.microsoft.com/office/drawing/2010/main" xmlns="" w="9525">
+                <a14:hiddenLine xmlns="" xmlns:a14="http://schemas.microsoft.com/office/drawing/2010/main" w="9525">
                   <a:solidFill>
                     <a:srgbClr val="000000"/>
                   </a:solidFill>
@@ -2875,7 +2880,7 @@
             </a:ln>
             <a:extLst>
               <a:ext uri="{91240B29-F687-4f45-9708-019B960494DF}">
-                <a14:hiddenLine xmlns:a14="http://schemas.microsoft.com/office/drawing/2010/main" xmlns="" w="9525">
+                <a14:hiddenLine xmlns="" xmlns:a14="http://schemas.microsoft.com/office/drawing/2010/main" w="9525">
                   <a:solidFill>
                     <a:srgbClr val="000000"/>
                   </a:solidFill>
@@ -2937,7 +2942,7 @@
             </a:ln>
             <a:extLst>
               <a:ext uri="{91240B29-F687-4f45-9708-019B960494DF}">
-                <a14:hiddenLine xmlns:a14="http://schemas.microsoft.com/office/drawing/2010/main" xmlns="" w="9525">
+                <a14:hiddenLine xmlns="" xmlns:a14="http://schemas.microsoft.com/office/drawing/2010/main" w="9525">
                   <a:solidFill>
                     <a:srgbClr val="000000"/>
                   </a:solidFill>
@@ -3027,7 +3032,7 @@
             </a:ln>
             <a:extLst>
               <a:ext uri="{91240B29-F687-4f45-9708-019B960494DF}">
-                <a14:hiddenLine xmlns:a14="http://schemas.microsoft.com/office/drawing/2010/main" xmlns="" w="9525">
+                <a14:hiddenLine xmlns="" xmlns:a14="http://schemas.microsoft.com/office/drawing/2010/main" w="9525">
                   <a:solidFill>
                     <a:srgbClr val="000000"/>
                   </a:solidFill>
@@ -3089,7 +3094,7 @@
             </a:ln>
             <a:extLst>
               <a:ext uri="{91240B29-F687-4f45-9708-019B960494DF}">
-                <a14:hiddenLine xmlns:a14="http://schemas.microsoft.com/office/drawing/2010/main" xmlns="" w="9525">
+                <a14:hiddenLine xmlns="" xmlns:a14="http://schemas.microsoft.com/office/drawing/2010/main" w="9525">
                   <a:solidFill>
                     <a:srgbClr val="000000"/>
                   </a:solidFill>
@@ -3179,7 +3184,7 @@
             </a:ln>
             <a:extLst>
               <a:ext uri="{91240B29-F687-4f45-9708-019B960494DF}">
-                <a14:hiddenLine xmlns:a14="http://schemas.microsoft.com/office/drawing/2010/main" xmlns="" w="9525">
+                <a14:hiddenLine xmlns="" xmlns:a14="http://schemas.microsoft.com/office/drawing/2010/main" w="9525">
                   <a:solidFill>
                     <a:srgbClr val="000000"/>
                   </a:solidFill>
@@ -3213,7 +3218,7 @@
             </a:ln>
             <a:extLst>
               <a:ext uri="{91240B29-F687-4f45-9708-019B960494DF}">
-                <a14:hiddenLine xmlns:a14="http://schemas.microsoft.com/office/drawing/2010/main" xmlns="" w="9525">
+                <a14:hiddenLine xmlns="" xmlns:a14="http://schemas.microsoft.com/office/drawing/2010/main" w="9525">
                   <a:solidFill>
                     <a:srgbClr val="000000"/>
                   </a:solidFill>
@@ -3278,7 +3283,7 @@
             </a:ln>
             <a:extLst>
               <a:ext uri="{91240B29-F687-4f45-9708-019B960494DF}">
-                <a14:hiddenLine xmlns:a14="http://schemas.microsoft.com/office/drawing/2010/main" xmlns="" w="9525">
+                <a14:hiddenLine xmlns="" xmlns:a14="http://schemas.microsoft.com/office/drawing/2010/main" w="9525">
                   <a:solidFill>
                     <a:srgbClr val="000000"/>
                   </a:solidFill>
@@ -3368,7 +3373,7 @@
             </a:ln>
             <a:extLst>
               <a:ext uri="{91240B29-F687-4f45-9708-019B960494DF}">
-                <a14:hiddenLine xmlns:a14="http://schemas.microsoft.com/office/drawing/2010/main" xmlns="" w="9525">
+                <a14:hiddenLine xmlns="" xmlns:a14="http://schemas.microsoft.com/office/drawing/2010/main" w="9525">
                   <a:solidFill>
                     <a:srgbClr val="000000"/>
                   </a:solidFill>
@@ -3430,7 +3435,7 @@
             </a:ln>
             <a:extLst>
               <a:ext uri="{91240B29-F687-4f45-9708-019B960494DF}">
-                <a14:hiddenLine xmlns:a14="http://schemas.microsoft.com/office/drawing/2010/main" xmlns="" w="9525">
+                <a14:hiddenLine xmlns="" xmlns:a14="http://schemas.microsoft.com/office/drawing/2010/main" w="9525">
                   <a:solidFill>
                     <a:srgbClr val="000000"/>
                   </a:solidFill>
@@ -3520,7 +3525,7 @@
             </a:ln>
             <a:extLst>
               <a:ext uri="{91240B29-F687-4f45-9708-019B960494DF}">
-                <a14:hiddenLine xmlns:a14="http://schemas.microsoft.com/office/drawing/2010/main" xmlns="" w="9525">
+                <a14:hiddenLine xmlns="" xmlns:a14="http://schemas.microsoft.com/office/drawing/2010/main" w="9525">
                   <a:solidFill>
                     <a:srgbClr val="000000"/>
                   </a:solidFill>
@@ -3610,7 +3615,7 @@
             </a:ln>
             <a:extLst>
               <a:ext uri="{91240B29-F687-4f45-9708-019B960494DF}">
-                <a14:hiddenLine xmlns:a14="http://schemas.microsoft.com/office/drawing/2010/main" xmlns="" w="9525">
+                <a14:hiddenLine xmlns="" xmlns:a14="http://schemas.microsoft.com/office/drawing/2010/main" w="9525">
                   <a:solidFill>
                     <a:srgbClr val="000000"/>
                   </a:solidFill>
@@ -3675,7 +3680,7 @@
             </a:ln>
             <a:extLst>
               <a:ext uri="{91240B29-F687-4f45-9708-019B960494DF}">
-                <a14:hiddenLine xmlns:a14="http://schemas.microsoft.com/office/drawing/2010/main" xmlns="" w="9525">
+                <a14:hiddenLine xmlns="" xmlns:a14="http://schemas.microsoft.com/office/drawing/2010/main" w="9525">
                   <a:solidFill>
                     <a:srgbClr val="000000"/>
                   </a:solidFill>
@@ -3737,7 +3742,7 @@
             </a:ln>
             <a:extLst>
               <a:ext uri="{91240B29-F687-4f45-9708-019B960494DF}">
-                <a14:hiddenLine xmlns:a14="http://schemas.microsoft.com/office/drawing/2010/main" xmlns="" w="9525">
+                <a14:hiddenLine xmlns="" xmlns:a14="http://schemas.microsoft.com/office/drawing/2010/main" w="9525">
                   <a:solidFill>
                     <a:srgbClr val="000000"/>
                   </a:solidFill>
@@ -3827,7 +3832,7 @@
             </a:ln>
             <a:extLst>
               <a:ext uri="{91240B29-F687-4f45-9708-019B960494DF}">
-                <a14:hiddenLine xmlns:a14="http://schemas.microsoft.com/office/drawing/2010/main" xmlns="" w="9525">
+                <a14:hiddenLine xmlns="" xmlns:a14="http://schemas.microsoft.com/office/drawing/2010/main" w="9525">
                   <a:solidFill>
                     <a:srgbClr val="000000"/>
                   </a:solidFill>
@@ -3917,7 +3922,7 @@
             </a:ln>
             <a:extLst>
               <a:ext uri="{91240B29-F687-4f45-9708-019B960494DF}">
-                <a14:hiddenLine xmlns:a14="http://schemas.microsoft.com/office/drawing/2010/main" xmlns="" w="9525">
+                <a14:hiddenLine xmlns="" xmlns:a14="http://schemas.microsoft.com/office/drawing/2010/main" w="9525">
                   <a:solidFill>
                     <a:srgbClr val="000000"/>
                   </a:solidFill>
@@ -3979,7 +3984,7 @@
             </a:ln>
             <a:extLst>
               <a:ext uri="{91240B29-F687-4f45-9708-019B960494DF}">
-                <a14:hiddenLine xmlns:a14="http://schemas.microsoft.com/office/drawing/2010/main" xmlns="" w="9525">
+                <a14:hiddenLine xmlns="" xmlns:a14="http://schemas.microsoft.com/office/drawing/2010/main" w="9525">
                   <a:solidFill>
                     <a:srgbClr val="000000"/>
                   </a:solidFill>
@@ -4099,7 +4104,7 @@
             </a:ln>
             <a:extLst>
               <a:ext uri="{91240B29-F687-4f45-9708-019B960494DF}">
-                <a14:hiddenLine xmlns:a14="http://schemas.microsoft.com/office/drawing/2010/main" xmlns="" w="9525">
+                <a14:hiddenLine xmlns="" xmlns:a14="http://schemas.microsoft.com/office/drawing/2010/main" w="9525">
                   <a:solidFill>
                     <a:srgbClr val="000000"/>
                   </a:solidFill>
@@ -4167,7 +4172,7 @@
             </a:ln>
             <a:extLst>
               <a:ext uri="{91240B29-F687-4f45-9708-019B960494DF}">
-                <a14:hiddenLine xmlns:a14="http://schemas.microsoft.com/office/drawing/2010/main" xmlns="" w="9525">
+                <a14:hiddenLine xmlns="" xmlns:a14="http://schemas.microsoft.com/office/drawing/2010/main" w="9525">
                   <a:solidFill>
                     <a:srgbClr val="000000"/>
                   </a:solidFill>
@@ -4257,7 +4262,7 @@
             </a:ln>
             <a:extLst>
               <a:ext uri="{91240B29-F687-4f45-9708-019B960494DF}">
-                <a14:hiddenLine xmlns:a14="http://schemas.microsoft.com/office/drawing/2010/main" xmlns="" w="9525">
+                <a14:hiddenLine xmlns="" xmlns:a14="http://schemas.microsoft.com/office/drawing/2010/main" w="9525">
                   <a:solidFill>
                     <a:srgbClr val="000000"/>
                   </a:solidFill>
@@ -4397,7 +4402,7 @@
           <a:p>
             <a:fld id="{48A87A34-81AB-432B-8DAE-1953F412C126}" type="datetimeFigureOut">
               <a:rPr lang="en-US" dirty="0"/>
-              <a:t>12/3/2016</a:t>
+              <a:t>12/5/16</a:t>
             </a:fld>
             <a:endParaRPr lang="en-US" dirty="0"/>
           </a:p>
@@ -4659,7 +4664,7 @@
           <a:p>
             <a:fld id="{48A87A34-81AB-432B-8DAE-1953F412C126}" type="datetimeFigureOut">
               <a:rPr lang="en-US" dirty="0"/>
-              <a:t>12/3/2016</a:t>
+              <a:t>12/5/16</a:t>
             </a:fld>
             <a:endParaRPr lang="en-US" dirty="0"/>
           </a:p>
@@ -4850,7 +4855,7 @@
           <a:p>
             <a:fld id="{48A87A34-81AB-432B-8DAE-1953F412C126}" type="datetimeFigureOut">
               <a:rPr lang="en-US" dirty="0"/>
-              <a:t>12/3/2016</a:t>
+              <a:t>12/5/16</a:t>
             </a:fld>
             <a:endParaRPr lang="en-US" dirty="0"/>
           </a:p>
@@ -5108,7 +5113,7 @@
           <a:p>
             <a:fld id="{48A87A34-81AB-432B-8DAE-1953F412C126}" type="datetimeFigureOut">
               <a:rPr lang="en-US" dirty="0"/>
-              <a:t>12/3/2016</a:t>
+              <a:t>12/5/16</a:t>
             </a:fld>
             <a:endParaRPr lang="en-US" dirty="0"/>
           </a:p>
@@ -5537,7 +5542,7 @@
           <a:p>
             <a:fld id="{48A87A34-81AB-432B-8DAE-1953F412C126}" type="datetimeFigureOut">
               <a:rPr lang="en-US" dirty="0"/>
-              <a:t>12/3/2016</a:t>
+              <a:t>12/5/16</a:t>
             </a:fld>
             <a:endParaRPr lang="en-US" dirty="0"/>
           </a:p>
@@ -6078,7 +6083,7 @@
           <a:p>
             <a:fld id="{48A87A34-81AB-432B-8DAE-1953F412C126}" type="datetimeFigureOut">
               <a:rPr lang="en-US" dirty="0"/>
-              <a:t>12/3/2016</a:t>
+              <a:t>12/5/16</a:t>
             </a:fld>
             <a:endParaRPr lang="en-US" dirty="0"/>
           </a:p>
@@ -6793,7 +6798,7 @@
           <a:p>
             <a:fld id="{48A87A34-81AB-432B-8DAE-1953F412C126}" type="datetimeFigureOut">
               <a:rPr lang="en-US" dirty="0"/>
-              <a:t>12/3/2016</a:t>
+              <a:t>12/5/16</a:t>
             </a:fld>
             <a:endParaRPr lang="en-US" dirty="0"/>
           </a:p>
@@ -6958,7 +6963,7 @@
           <a:p>
             <a:fld id="{48A87A34-81AB-432B-8DAE-1953F412C126}" type="datetimeFigureOut">
               <a:rPr lang="en-US" dirty="0"/>
-              <a:t>12/3/2016</a:t>
+              <a:t>12/5/16</a:t>
             </a:fld>
             <a:endParaRPr lang="en-US" dirty="0"/>
           </a:p>
@@ -7133,7 +7138,7 @@
           <a:p>
             <a:fld id="{48A87A34-81AB-432B-8DAE-1953F412C126}" type="datetimeFigureOut">
               <a:rPr lang="en-US" dirty="0"/>
-              <a:t>12/3/2016</a:t>
+              <a:t>12/5/16</a:t>
             </a:fld>
             <a:endParaRPr lang="en-US" dirty="0"/>
           </a:p>
@@ -7298,7 +7303,7 @@
           <a:p>
             <a:fld id="{48A87A34-81AB-432B-8DAE-1953F412C126}" type="datetimeFigureOut">
               <a:rPr lang="en-US" dirty="0"/>
-              <a:t>12/3/2016</a:t>
+              <a:t>12/5/16</a:t>
             </a:fld>
             <a:endParaRPr lang="en-US" dirty="0"/>
           </a:p>
@@ -7543,7 +7548,7 @@
           <a:p>
             <a:fld id="{48A87A34-81AB-432B-8DAE-1953F412C126}" type="datetimeFigureOut">
               <a:rPr lang="en-US" dirty="0"/>
-              <a:t>12/3/2016</a:t>
+              <a:t>12/5/16</a:t>
             </a:fld>
             <a:endParaRPr lang="en-US" dirty="0"/>
           </a:p>
@@ -7770,7 +7775,7 @@
           <a:p>
             <a:fld id="{48A87A34-81AB-432B-8DAE-1953F412C126}" type="datetimeFigureOut">
               <a:rPr lang="en-US" dirty="0"/>
-              <a:t>12/3/2016</a:t>
+              <a:t>12/5/16</a:t>
             </a:fld>
             <a:endParaRPr lang="en-US" dirty="0"/>
           </a:p>
@@ -8146,7 +8151,7 @@
           <a:p>
             <a:fld id="{48A87A34-81AB-432B-8DAE-1953F412C126}" type="datetimeFigureOut">
               <a:rPr lang="en-US" dirty="0"/>
-              <a:t>12/3/2016</a:t>
+              <a:t>12/5/16</a:t>
             </a:fld>
             <a:endParaRPr lang="en-US" dirty="0"/>
           </a:p>
@@ -8259,7 +8264,7 @@
           <a:p>
             <a:fld id="{48A87A34-81AB-432B-8DAE-1953F412C126}" type="datetimeFigureOut">
               <a:rPr lang="en-US" dirty="0"/>
-              <a:t>12/3/2016</a:t>
+              <a:t>12/5/16</a:t>
             </a:fld>
             <a:endParaRPr lang="en-US" dirty="0"/>
           </a:p>
@@ -8349,7 +8354,7 @@
           <a:p>
             <a:fld id="{48A87A34-81AB-432B-8DAE-1953F412C126}" type="datetimeFigureOut">
               <a:rPr lang="en-US" dirty="0"/>
-              <a:t>12/3/2016</a:t>
+              <a:t>12/5/16</a:t>
             </a:fld>
             <a:endParaRPr lang="en-US" dirty="0"/>
           </a:p>
@@ -8593,7 +8598,7 @@
           <a:p>
             <a:fld id="{48A87A34-81AB-432B-8DAE-1953F412C126}" type="datetimeFigureOut">
               <a:rPr lang="en-US" dirty="0"/>
-              <a:t>12/3/2016</a:t>
+              <a:t>12/5/16</a:t>
             </a:fld>
             <a:endParaRPr lang="en-US" dirty="0"/>
           </a:p>
@@ -8868,7 +8873,7 @@
           <a:p>
             <a:fld id="{48A87A34-81AB-432B-8DAE-1953F412C126}" type="datetimeFigureOut">
               <a:rPr lang="en-US" dirty="0"/>
-              <a:t>12/3/2016</a:t>
+              <a:t>12/5/16</a:t>
             </a:fld>
             <a:endParaRPr lang="en-US" dirty="0"/>
           </a:p>
@@ -8986,7 +8991,7 @@
           <a:noFill/>
           <a:extLst>
             <a:ext uri="{909E8E84-426E-40dd-AFC4-6F175D3DCCD1}">
-              <a14:hiddenFill xmlns:a14="http://schemas.microsoft.com/office/drawing/2010/main" xmlns="">
+              <a14:hiddenFill xmlns="" xmlns:a14="http://schemas.microsoft.com/office/drawing/2010/main">
                 <a:solidFill>
                   <a:srgbClr val="FFFFFF"/>
                 </a:solidFill>
@@ -9060,7 +9065,7 @@
               </a:ln>
               <a:extLst>
                 <a:ext uri="{91240B29-F687-4f45-9708-019B960494DF}">
-                  <a14:hiddenLine xmlns:a14="http://schemas.microsoft.com/office/drawing/2010/main" xmlns="" w="9525">
+                  <a14:hiddenLine xmlns="" xmlns:a14="http://schemas.microsoft.com/office/drawing/2010/main" w="9525">
                     <a:solidFill>
                       <a:srgbClr val="000000"/>
                     </a:solidFill>
@@ -9150,7 +9155,7 @@
               </a:ln>
               <a:extLst>
                 <a:ext uri="{91240B29-F687-4f45-9708-019B960494DF}">
-                  <a14:hiddenLine xmlns:a14="http://schemas.microsoft.com/office/drawing/2010/main" xmlns="" w="9525">
+                  <a14:hiddenLine xmlns="" xmlns:a14="http://schemas.microsoft.com/office/drawing/2010/main" w="9525">
                     <a:solidFill>
                       <a:srgbClr val="000000"/>
                     </a:solidFill>
@@ -9240,7 +9245,7 @@
               </a:ln>
               <a:extLst>
                 <a:ext uri="{91240B29-F687-4f45-9708-019B960494DF}">
-                  <a14:hiddenLine xmlns:a14="http://schemas.microsoft.com/office/drawing/2010/main" xmlns="" w="9525">
+                  <a14:hiddenLine xmlns="" xmlns:a14="http://schemas.microsoft.com/office/drawing/2010/main" w="9525">
                     <a:solidFill>
                       <a:srgbClr val="000000"/>
                     </a:solidFill>
@@ -9302,7 +9307,7 @@
               </a:ln>
               <a:extLst>
                 <a:ext uri="{91240B29-F687-4f45-9708-019B960494DF}">
-                  <a14:hiddenLine xmlns:a14="http://schemas.microsoft.com/office/drawing/2010/main" xmlns="" w="9525">
+                  <a14:hiddenLine xmlns="" xmlns:a14="http://schemas.microsoft.com/office/drawing/2010/main" w="9525">
                     <a:solidFill>
                       <a:srgbClr val="000000"/>
                     </a:solidFill>
@@ -9392,7 +9397,7 @@
               </a:ln>
               <a:extLst>
                 <a:ext uri="{91240B29-F687-4f45-9708-019B960494DF}">
-                  <a14:hiddenLine xmlns:a14="http://schemas.microsoft.com/office/drawing/2010/main" xmlns="" w="9525">
+                  <a14:hiddenLine xmlns="" xmlns:a14="http://schemas.microsoft.com/office/drawing/2010/main" w="9525">
                     <a:solidFill>
                       <a:srgbClr val="000000"/>
                     </a:solidFill>
@@ -9454,7 +9459,7 @@
               </a:ln>
               <a:extLst>
                 <a:ext uri="{91240B29-F687-4f45-9708-019B960494DF}">
-                  <a14:hiddenLine xmlns:a14="http://schemas.microsoft.com/office/drawing/2010/main" xmlns="" w="9525">
+                  <a14:hiddenLine xmlns="" xmlns:a14="http://schemas.microsoft.com/office/drawing/2010/main" w="9525">
                     <a:solidFill>
                       <a:srgbClr val="000000"/>
                     </a:solidFill>
@@ -9516,7 +9521,7 @@
               </a:ln>
               <a:extLst>
                 <a:ext uri="{91240B29-F687-4f45-9708-019B960494DF}">
-                  <a14:hiddenLine xmlns:a14="http://schemas.microsoft.com/office/drawing/2010/main" xmlns="" w="9525">
+                  <a14:hiddenLine xmlns="" xmlns:a14="http://schemas.microsoft.com/office/drawing/2010/main" w="9525">
                     <a:solidFill>
                       <a:srgbClr val="000000"/>
                     </a:solidFill>
@@ -9606,7 +9611,7 @@
               </a:ln>
               <a:extLst>
                 <a:ext uri="{91240B29-F687-4f45-9708-019B960494DF}">
-                  <a14:hiddenLine xmlns:a14="http://schemas.microsoft.com/office/drawing/2010/main" xmlns="" w="9525">
+                  <a14:hiddenLine xmlns="" xmlns:a14="http://schemas.microsoft.com/office/drawing/2010/main" w="9525">
                     <a:solidFill>
                       <a:srgbClr val="000000"/>
                     </a:solidFill>
@@ -9696,7 +9701,7 @@
               </a:ln>
               <a:extLst>
                 <a:ext uri="{91240B29-F687-4f45-9708-019B960494DF}">
-                  <a14:hiddenLine xmlns:a14="http://schemas.microsoft.com/office/drawing/2010/main" xmlns="" w="9525">
+                  <a14:hiddenLine xmlns="" xmlns:a14="http://schemas.microsoft.com/office/drawing/2010/main" w="9525">
                     <a:solidFill>
                       <a:srgbClr val="000000"/>
                     </a:solidFill>
@@ -9758,7 +9763,7 @@
               </a:ln>
               <a:extLst>
                 <a:ext uri="{91240B29-F687-4f45-9708-019B960494DF}">
-                  <a14:hiddenLine xmlns:a14="http://schemas.microsoft.com/office/drawing/2010/main" xmlns="" w="9525">
+                  <a14:hiddenLine xmlns="" xmlns:a14="http://schemas.microsoft.com/office/drawing/2010/main" w="9525">
                     <a:solidFill>
                       <a:srgbClr val="000000"/>
                     </a:solidFill>
@@ -9868,7 +9873,7 @@
               </a:ln>
               <a:extLst>
                 <a:ext uri="{91240B29-F687-4f45-9708-019B960494DF}">
-                  <a14:hiddenLine xmlns:a14="http://schemas.microsoft.com/office/drawing/2010/main" xmlns="" w="9525">
+                  <a14:hiddenLine xmlns="" xmlns:a14="http://schemas.microsoft.com/office/drawing/2010/main" w="9525">
                     <a:solidFill>
                       <a:srgbClr val="000000"/>
                     </a:solidFill>
@@ -9952,7 +9957,7 @@
               </a:ln>
               <a:extLst>
                 <a:ext uri="{91240B29-F687-4f45-9708-019B960494DF}">
-                  <a14:hiddenLine xmlns:a14="http://schemas.microsoft.com/office/drawing/2010/main" xmlns="" w="9525">
+                  <a14:hiddenLine xmlns="" xmlns:a14="http://schemas.microsoft.com/office/drawing/2010/main" w="9525">
                     <a:solidFill>
                       <a:srgbClr val="000000"/>
                     </a:solidFill>
@@ -10014,7 +10019,7 @@
               </a:ln>
               <a:extLst>
                 <a:ext uri="{91240B29-F687-4f45-9708-019B960494DF}">
-                  <a14:hiddenLine xmlns:a14="http://schemas.microsoft.com/office/drawing/2010/main" xmlns="" w="9525">
+                  <a14:hiddenLine xmlns="" xmlns:a14="http://schemas.microsoft.com/office/drawing/2010/main" w="9525">
                     <a:solidFill>
                       <a:srgbClr val="000000"/>
                     </a:solidFill>
@@ -10076,7 +10081,7 @@
               </a:ln>
               <a:extLst>
                 <a:ext uri="{91240B29-F687-4f45-9708-019B960494DF}">
-                  <a14:hiddenLine xmlns:a14="http://schemas.microsoft.com/office/drawing/2010/main" xmlns="" w="9525">
+                  <a14:hiddenLine xmlns="" xmlns:a14="http://schemas.microsoft.com/office/drawing/2010/main" w="9525">
                     <a:solidFill>
                       <a:srgbClr val="000000"/>
                     </a:solidFill>
@@ -10166,7 +10171,7 @@
               </a:ln>
               <a:extLst>
                 <a:ext uri="{91240B29-F687-4f45-9708-019B960494DF}">
-                  <a14:hiddenLine xmlns:a14="http://schemas.microsoft.com/office/drawing/2010/main" xmlns="" w="9525">
+                  <a14:hiddenLine xmlns="" xmlns:a14="http://schemas.microsoft.com/office/drawing/2010/main" w="9525">
                     <a:solidFill>
                       <a:srgbClr val="000000"/>
                     </a:solidFill>
@@ -10200,7 +10205,7 @@
               </a:ln>
               <a:extLst>
                 <a:ext uri="{91240B29-F687-4f45-9708-019B960494DF}">
-                  <a14:hiddenLine xmlns:a14="http://schemas.microsoft.com/office/drawing/2010/main" xmlns="" w="9525">
+                  <a14:hiddenLine xmlns="" xmlns:a14="http://schemas.microsoft.com/office/drawing/2010/main" w="9525">
                     <a:solidFill>
                       <a:srgbClr val="000000"/>
                     </a:solidFill>
@@ -10265,7 +10270,7 @@
               </a:ln>
               <a:extLst>
                 <a:ext uri="{91240B29-F687-4f45-9708-019B960494DF}">
-                  <a14:hiddenLine xmlns:a14="http://schemas.microsoft.com/office/drawing/2010/main" xmlns="" w="9525">
+                  <a14:hiddenLine xmlns="" xmlns:a14="http://schemas.microsoft.com/office/drawing/2010/main" w="9525">
                     <a:solidFill>
                       <a:srgbClr val="000000"/>
                     </a:solidFill>
@@ -10355,7 +10360,7 @@
               </a:ln>
               <a:extLst>
                 <a:ext uri="{91240B29-F687-4f45-9708-019B960494DF}">
-                  <a14:hiddenLine xmlns:a14="http://schemas.microsoft.com/office/drawing/2010/main" xmlns="" w="9525">
+                  <a14:hiddenLine xmlns="" xmlns:a14="http://schemas.microsoft.com/office/drawing/2010/main" w="9525">
                     <a:solidFill>
                       <a:srgbClr val="000000"/>
                     </a:solidFill>
@@ -10417,7 +10422,7 @@
               </a:ln>
               <a:extLst>
                 <a:ext uri="{91240B29-F687-4f45-9708-019B960494DF}">
-                  <a14:hiddenLine xmlns:a14="http://schemas.microsoft.com/office/drawing/2010/main" xmlns="" w="9525">
+                  <a14:hiddenLine xmlns="" xmlns:a14="http://schemas.microsoft.com/office/drawing/2010/main" w="9525">
                     <a:solidFill>
                       <a:srgbClr val="000000"/>
                     </a:solidFill>
@@ -10507,7 +10512,7 @@
               </a:ln>
               <a:extLst>
                 <a:ext uri="{91240B29-F687-4f45-9708-019B960494DF}">
-                  <a14:hiddenLine xmlns:a14="http://schemas.microsoft.com/office/drawing/2010/main" xmlns="" w="9525">
+                  <a14:hiddenLine xmlns="" xmlns:a14="http://schemas.microsoft.com/office/drawing/2010/main" w="9525">
                     <a:solidFill>
                       <a:srgbClr val="000000"/>
                     </a:solidFill>
@@ -10572,7 +10577,7 @@
               </a:ln>
               <a:extLst>
                 <a:ext uri="{91240B29-F687-4f45-9708-019B960494DF}">
-                  <a14:hiddenLine xmlns:a14="http://schemas.microsoft.com/office/drawing/2010/main" xmlns="" w="9525">
+                  <a14:hiddenLine xmlns="" xmlns:a14="http://schemas.microsoft.com/office/drawing/2010/main" w="9525">
                     <a:solidFill>
                       <a:srgbClr val="000000"/>
                     </a:solidFill>
@@ -10634,7 +10639,7 @@
               </a:ln>
               <a:extLst>
                 <a:ext uri="{91240B29-F687-4f45-9708-019B960494DF}">
-                  <a14:hiddenLine xmlns:a14="http://schemas.microsoft.com/office/drawing/2010/main" xmlns="" w="9525">
+                  <a14:hiddenLine xmlns="" xmlns:a14="http://schemas.microsoft.com/office/drawing/2010/main" w="9525">
                     <a:solidFill>
                       <a:srgbClr val="000000"/>
                     </a:solidFill>
@@ -10724,7 +10729,7 @@
               </a:ln>
               <a:extLst>
                 <a:ext uri="{91240B29-F687-4f45-9708-019B960494DF}">
-                  <a14:hiddenLine xmlns:a14="http://schemas.microsoft.com/office/drawing/2010/main" xmlns="" w="9525">
+                  <a14:hiddenLine xmlns="" xmlns:a14="http://schemas.microsoft.com/office/drawing/2010/main" w="9525">
                     <a:solidFill>
                       <a:srgbClr val="000000"/>
                     </a:solidFill>
@@ -10814,7 +10819,7 @@
               </a:ln>
               <a:extLst>
                 <a:ext uri="{91240B29-F687-4f45-9708-019B960494DF}">
-                  <a14:hiddenLine xmlns:a14="http://schemas.microsoft.com/office/drawing/2010/main" xmlns="" w="9525">
+                  <a14:hiddenLine xmlns="" xmlns:a14="http://schemas.microsoft.com/office/drawing/2010/main" w="9525">
                     <a:solidFill>
                       <a:srgbClr val="000000"/>
                     </a:solidFill>
@@ -10879,7 +10884,7 @@
               </a:ln>
               <a:extLst>
                 <a:ext uri="{91240B29-F687-4f45-9708-019B960494DF}">
-                  <a14:hiddenLine xmlns:a14="http://schemas.microsoft.com/office/drawing/2010/main" xmlns="" w="9525">
+                  <a14:hiddenLine xmlns="" xmlns:a14="http://schemas.microsoft.com/office/drawing/2010/main" w="9525">
                     <a:solidFill>
                       <a:srgbClr val="000000"/>
                     </a:solidFill>
@@ -10999,7 +11004,7 @@
               </a:ln>
               <a:extLst>
                 <a:ext uri="{91240B29-F687-4f45-9708-019B960494DF}">
-                  <a14:hiddenLine xmlns:a14="http://schemas.microsoft.com/office/drawing/2010/main" xmlns="" w="9525">
+                  <a14:hiddenLine xmlns="" xmlns:a14="http://schemas.microsoft.com/office/drawing/2010/main" w="9525">
                     <a:solidFill>
                       <a:srgbClr val="000000"/>
                     </a:solidFill>
@@ -11080,7 +11085,7 @@
               </a:ln>
               <a:extLst>
                 <a:ext uri="{91240B29-F687-4f45-9708-019B960494DF}">
-                  <a14:hiddenLine xmlns:a14="http://schemas.microsoft.com/office/drawing/2010/main" xmlns="" w="9525">
+                  <a14:hiddenLine xmlns="" xmlns:a14="http://schemas.microsoft.com/office/drawing/2010/main" w="9525">
                     <a:solidFill>
                       <a:srgbClr val="000000"/>
                     </a:solidFill>
@@ -11195,7 +11200,7 @@
               </a:ln>
               <a:extLst>
                 <a:ext uri="{91240B29-F687-4f45-9708-019B960494DF}">
-                  <a14:hiddenLine xmlns:a14="http://schemas.microsoft.com/office/drawing/2010/main" xmlns="" w="9525">
+                  <a14:hiddenLine xmlns="" xmlns:a14="http://schemas.microsoft.com/office/drawing/2010/main" w="9525">
                     <a:solidFill>
                       <a:srgbClr val="000000"/>
                     </a:solidFill>
@@ -11285,7 +11290,7 @@
               </a:ln>
               <a:extLst>
                 <a:ext uri="{91240B29-F687-4f45-9708-019B960494DF}">
-                  <a14:hiddenLine xmlns:a14="http://schemas.microsoft.com/office/drawing/2010/main" xmlns="" w="9525">
+                  <a14:hiddenLine xmlns="" xmlns:a14="http://schemas.microsoft.com/office/drawing/2010/main" w="9525">
                     <a:solidFill>
                       <a:srgbClr val="000000"/>
                     </a:solidFill>
@@ -11350,7 +11355,7 @@
               </a:ln>
               <a:extLst>
                 <a:ext uri="{91240B29-F687-4f45-9708-019B960494DF}">
-                  <a14:hiddenLine xmlns:a14="http://schemas.microsoft.com/office/drawing/2010/main" xmlns="" w="9525">
+                  <a14:hiddenLine xmlns="" xmlns:a14="http://schemas.microsoft.com/office/drawing/2010/main" w="9525">
                     <a:solidFill>
                       <a:srgbClr val="000000"/>
                     </a:solidFill>
@@ -11440,7 +11445,7 @@
               </a:ln>
               <a:extLst>
                 <a:ext uri="{91240B29-F687-4f45-9708-019B960494DF}">
-                  <a14:hiddenLine xmlns:a14="http://schemas.microsoft.com/office/drawing/2010/main" xmlns="" w="9525">
+                  <a14:hiddenLine xmlns="" xmlns:a14="http://schemas.microsoft.com/office/drawing/2010/main" w="9525">
                     <a:solidFill>
                       <a:srgbClr val="000000"/>
                     </a:solidFill>
@@ -11508,7 +11513,7 @@
               </a:ln>
               <a:extLst>
                 <a:ext uri="{91240B29-F687-4f45-9708-019B960494DF}">
-                  <a14:hiddenLine xmlns:a14="http://schemas.microsoft.com/office/drawing/2010/main" xmlns="" w="9525">
+                  <a14:hiddenLine xmlns="" xmlns:a14="http://schemas.microsoft.com/office/drawing/2010/main" w="9525">
                     <a:solidFill>
                       <a:srgbClr val="000000"/>
                     </a:solidFill>
@@ -11598,7 +11603,7 @@
               </a:ln>
               <a:extLst>
                 <a:ext uri="{91240B29-F687-4f45-9708-019B960494DF}">
-                  <a14:hiddenLine xmlns:a14="http://schemas.microsoft.com/office/drawing/2010/main" xmlns="" w="9525">
+                  <a14:hiddenLine xmlns="" xmlns:a14="http://schemas.microsoft.com/office/drawing/2010/main" w="9525">
                     <a:solidFill>
                       <a:srgbClr val="000000"/>
                     </a:solidFill>
@@ -11666,7 +11671,7 @@
               </a:ln>
               <a:extLst>
                 <a:ext uri="{91240B29-F687-4f45-9708-019B960494DF}">
-                  <a14:hiddenLine xmlns:a14="http://schemas.microsoft.com/office/drawing/2010/main" xmlns="" w="9525">
+                  <a14:hiddenLine xmlns="" xmlns:a14="http://schemas.microsoft.com/office/drawing/2010/main" w="9525">
                     <a:solidFill>
                       <a:srgbClr val="000000"/>
                     </a:solidFill>
@@ -11756,7 +11761,7 @@
               </a:ln>
               <a:extLst>
                 <a:ext uri="{91240B29-F687-4f45-9708-019B960494DF}">
-                  <a14:hiddenLine xmlns:a14="http://schemas.microsoft.com/office/drawing/2010/main" xmlns="" w="9525">
+                  <a14:hiddenLine xmlns="" xmlns:a14="http://schemas.microsoft.com/office/drawing/2010/main" w="9525">
                     <a:solidFill>
                       <a:srgbClr val="000000"/>
                     </a:solidFill>
@@ -11790,7 +11795,7 @@
               </a:ln>
               <a:extLst>
                 <a:ext uri="{91240B29-F687-4f45-9708-019B960494DF}">
-                  <a14:hiddenLine xmlns:a14="http://schemas.microsoft.com/office/drawing/2010/main" xmlns="" w="9525">
+                  <a14:hiddenLine xmlns="" xmlns:a14="http://schemas.microsoft.com/office/drawing/2010/main" w="9525">
                     <a:solidFill>
                       <a:srgbClr val="000000"/>
                     </a:solidFill>
@@ -11931,7 +11936,7 @@
             <a:fld id="{48A87A34-81AB-432B-8DAE-1953F412C126}" type="datetimeFigureOut">
               <a:rPr lang="en-US" dirty="0"/>
               <a:pPr/>
-              <a:t>12/3/2016</a:t>
+              <a:t>12/5/16</a:t>
             </a:fld>
             <a:endParaRPr lang="en-US" dirty="0"/>
           </a:p>
@@ -12513,8 +12518,13 @@
           <a:p>
             <a:r>
               <a:rPr lang="en-US" dirty="0"/>
-              <a:t>Bootstrap CSS – for styling</a:t>
-            </a:r>
+              <a:t>Bootstrap CSS – for </a:t>
+            </a:r>
+            <a:r>
+              <a:rPr lang="en-US" dirty="0" smtClean="0"/>
+              <a:t>styling forms</a:t>
+            </a:r>
+            <a:endParaRPr lang="en-US" dirty="0"/>
           </a:p>
           <a:p>
             <a:r>
@@ -13197,13 +13207,30 @@
           </a:p>
           <a:p>
             <a:r>
-              <a:rPr lang="en-US" dirty="0" err="1"/>
-              <a:t>Mikah</a:t>
-            </a:r>
-            <a:r>
               <a:rPr lang="en-US" dirty="0"/>
-              <a:t>: Got us converted from basic CSS to Bootstrap, did the other few of the original pages shown at the midterm presentation.</a:t>
-            </a:r>
+              <a:t>Mikah: </a:t>
+            </a:r>
+            <a:r>
+              <a:rPr lang="en-US" dirty="0" smtClean="0"/>
+              <a:t>Applied Bootstrap to the form components, </a:t>
+            </a:r>
+            <a:r>
+              <a:rPr lang="en-US" dirty="0"/>
+              <a:t>did the other few of the original </a:t>
+            </a:r>
+            <a:r>
+              <a:rPr lang="en-US" dirty="0" smtClean="0"/>
+              <a:t>webpages </a:t>
+            </a:r>
+            <a:r>
+              <a:rPr lang="en-US" dirty="0"/>
+              <a:t>shown at the midterm presentation</a:t>
+            </a:r>
+            <a:r>
+              <a:rPr lang="en-US" dirty="0" smtClean="0"/>
+              <a:t>. Some front-end and the breadcrumbs.</a:t>
+            </a:r>
+            <a:endParaRPr lang="en-US" dirty="0"/>
           </a:p>
           <a:p>
             <a:r>

</xml_diff>

<commit_message>
Final update from me on the Powerpoint.
</commit_message>
<xml_diff>
--- a/Course project.pptx
+++ b/Course project.pptx
@@ -112,6 +112,11 @@
       </a:defRPr>
     </a:lvl9pPr>
   </p:defaultTextStyle>
+  <p:extLst>
+    <p:ext uri="{EFAFB233-063F-42B5-8137-9DF3F51BA10A}">
+      <p15:sldGuideLst xmlns:p15="http://schemas.microsoft.com/office/powerpoint/2012/main"/>
+    </p:ext>
+  </p:extLst>
 </p:presentation>
 </file>
 
@@ -172,7 +177,7 @@
           <a:noFill/>
           <a:extLst>
             <a:ext uri="{909E8E84-426E-40dd-AFC4-6F175D3DCCD1}">
-              <a14:hiddenFill xmlns:a14="http://schemas.microsoft.com/office/drawing/2010/main" xmlns="">
+              <a14:hiddenFill xmlns="" xmlns:a14="http://schemas.microsoft.com/office/drawing/2010/main">
                 <a:solidFill>
                   <a:srgbClr val="FFFFFF"/>
                 </a:solidFill>
@@ -231,7 +236,7 @@
             </a:ln>
             <a:extLst>
               <a:ext uri="{91240B29-F687-4f45-9708-019B960494DF}">
-                <a14:hiddenLine xmlns:a14="http://schemas.microsoft.com/office/drawing/2010/main" xmlns="" w="9525">
+                <a14:hiddenLine xmlns="" xmlns:a14="http://schemas.microsoft.com/office/drawing/2010/main" w="9525">
                   <a:solidFill>
                     <a:srgbClr val="000000"/>
                   </a:solidFill>
@@ -321,7 +326,7 @@
             </a:ln>
             <a:extLst>
               <a:ext uri="{91240B29-F687-4f45-9708-019B960494DF}">
-                <a14:hiddenLine xmlns:a14="http://schemas.microsoft.com/office/drawing/2010/main" xmlns="" w="9525">
+                <a14:hiddenLine xmlns="" xmlns:a14="http://schemas.microsoft.com/office/drawing/2010/main" w="9525">
                   <a:solidFill>
                     <a:srgbClr val="000000"/>
                   </a:solidFill>
@@ -411,7 +416,7 @@
             </a:ln>
             <a:extLst>
               <a:ext uri="{91240B29-F687-4f45-9708-019B960494DF}">
-                <a14:hiddenLine xmlns:a14="http://schemas.microsoft.com/office/drawing/2010/main" xmlns="" w="9525">
+                <a14:hiddenLine xmlns="" xmlns:a14="http://schemas.microsoft.com/office/drawing/2010/main" w="9525">
                   <a:solidFill>
                     <a:srgbClr val="000000"/>
                   </a:solidFill>
@@ -445,7 +450,7 @@
             </a:ln>
             <a:extLst>
               <a:ext uri="{91240B29-F687-4f45-9708-019B960494DF}">
-                <a14:hiddenLine xmlns:a14="http://schemas.microsoft.com/office/drawing/2010/main" xmlns="" w="9525">
+                <a14:hiddenLine xmlns="" xmlns:a14="http://schemas.microsoft.com/office/drawing/2010/main" w="9525">
                   <a:solidFill>
                     <a:srgbClr val="000000"/>
                   </a:solidFill>
@@ -535,7 +540,7 @@
             </a:ln>
             <a:extLst>
               <a:ext uri="{91240B29-F687-4f45-9708-019B960494DF}">
-                <a14:hiddenLine xmlns:a14="http://schemas.microsoft.com/office/drawing/2010/main" xmlns="" w="9525">
+                <a14:hiddenLine xmlns="" xmlns:a14="http://schemas.microsoft.com/office/drawing/2010/main" w="9525">
                   <a:solidFill>
                     <a:srgbClr val="000000"/>
                   </a:solidFill>
@@ -597,7 +602,7 @@
             </a:ln>
             <a:extLst>
               <a:ext uri="{91240B29-F687-4f45-9708-019B960494DF}">
-                <a14:hiddenLine xmlns:a14="http://schemas.microsoft.com/office/drawing/2010/main" xmlns="" w="9525">
+                <a14:hiddenLine xmlns="" xmlns:a14="http://schemas.microsoft.com/office/drawing/2010/main" w="9525">
                   <a:solidFill>
                     <a:srgbClr val="000000"/>
                   </a:solidFill>
@@ -659,7 +664,7 @@
             </a:ln>
             <a:extLst>
               <a:ext uri="{91240B29-F687-4f45-9708-019B960494DF}">
-                <a14:hiddenLine xmlns:a14="http://schemas.microsoft.com/office/drawing/2010/main" xmlns="" w="9525">
+                <a14:hiddenLine xmlns="" xmlns:a14="http://schemas.microsoft.com/office/drawing/2010/main" w="9525">
                   <a:solidFill>
                     <a:srgbClr val="000000"/>
                   </a:solidFill>
@@ -749,7 +754,7 @@
             </a:ln>
             <a:extLst>
               <a:ext uri="{91240B29-F687-4f45-9708-019B960494DF}">
-                <a14:hiddenLine xmlns:a14="http://schemas.microsoft.com/office/drawing/2010/main" xmlns="" w="9525">
+                <a14:hiddenLine xmlns="" xmlns:a14="http://schemas.microsoft.com/office/drawing/2010/main" w="9525">
                   <a:solidFill>
                     <a:srgbClr val="000000"/>
                   </a:solidFill>
@@ -811,7 +816,7 @@
             </a:ln>
             <a:extLst>
               <a:ext uri="{91240B29-F687-4f45-9708-019B960494DF}">
-                <a14:hiddenLine xmlns:a14="http://schemas.microsoft.com/office/drawing/2010/main" xmlns="" w="9525">
+                <a14:hiddenLine xmlns="" xmlns:a14="http://schemas.microsoft.com/office/drawing/2010/main" w="9525">
                   <a:solidFill>
                     <a:srgbClr val="000000"/>
                   </a:solidFill>
@@ -873,7 +878,7 @@
             </a:ln>
             <a:extLst>
               <a:ext uri="{91240B29-F687-4f45-9708-019B960494DF}">
-                <a14:hiddenLine xmlns:a14="http://schemas.microsoft.com/office/drawing/2010/main" xmlns="" w="9525">
+                <a14:hiddenLine xmlns="" xmlns:a14="http://schemas.microsoft.com/office/drawing/2010/main" w="9525">
                   <a:solidFill>
                     <a:srgbClr val="000000"/>
                   </a:solidFill>
@@ -963,7 +968,7 @@
             </a:ln>
             <a:extLst>
               <a:ext uri="{91240B29-F687-4f45-9708-019B960494DF}">
-                <a14:hiddenLine xmlns:a14="http://schemas.microsoft.com/office/drawing/2010/main" xmlns="" w="9525">
+                <a14:hiddenLine xmlns="" xmlns:a14="http://schemas.microsoft.com/office/drawing/2010/main" w="9525">
                   <a:solidFill>
                     <a:srgbClr val="000000"/>
                   </a:solidFill>
@@ -1053,7 +1058,7 @@
             </a:ln>
             <a:extLst>
               <a:ext uri="{91240B29-F687-4f45-9708-019B960494DF}">
-                <a14:hiddenLine xmlns:a14="http://schemas.microsoft.com/office/drawing/2010/main" xmlns="" w="9525">
+                <a14:hiddenLine xmlns="" xmlns:a14="http://schemas.microsoft.com/office/drawing/2010/main" w="9525">
                   <a:solidFill>
                     <a:srgbClr val="000000"/>
                   </a:solidFill>
@@ -1115,7 +1120,7 @@
             </a:ln>
             <a:extLst>
               <a:ext uri="{91240B29-F687-4f45-9708-019B960494DF}">
-                <a14:hiddenLine xmlns:a14="http://schemas.microsoft.com/office/drawing/2010/main" xmlns="" w="9525">
+                <a14:hiddenLine xmlns="" xmlns:a14="http://schemas.microsoft.com/office/drawing/2010/main" w="9525">
                   <a:solidFill>
                     <a:srgbClr val="000000"/>
                   </a:solidFill>
@@ -1225,7 +1230,7 @@
             </a:ln>
             <a:extLst>
               <a:ext uri="{91240B29-F687-4f45-9708-019B960494DF}">
-                <a14:hiddenLine xmlns:a14="http://schemas.microsoft.com/office/drawing/2010/main" xmlns="" w="9525">
+                <a14:hiddenLine xmlns="" xmlns:a14="http://schemas.microsoft.com/office/drawing/2010/main" w="9525">
                   <a:solidFill>
                     <a:srgbClr val="000000"/>
                   </a:solidFill>
@@ -1287,7 +1292,7 @@
             </a:ln>
             <a:extLst>
               <a:ext uri="{91240B29-F687-4f45-9708-019B960494DF}">
-                <a14:hiddenLine xmlns:a14="http://schemas.microsoft.com/office/drawing/2010/main" xmlns="" w="9525">
+                <a14:hiddenLine xmlns="" xmlns:a14="http://schemas.microsoft.com/office/drawing/2010/main" w="9525">
                   <a:solidFill>
                     <a:srgbClr val="000000"/>
                   </a:solidFill>
@@ -1377,7 +1382,7 @@
             </a:ln>
             <a:extLst>
               <a:ext uri="{91240B29-F687-4f45-9708-019B960494DF}">
-                <a14:hiddenLine xmlns:a14="http://schemas.microsoft.com/office/drawing/2010/main" xmlns="" w="9525">
+                <a14:hiddenLine xmlns="" xmlns:a14="http://schemas.microsoft.com/office/drawing/2010/main" w="9525">
                   <a:solidFill>
                     <a:srgbClr val="000000"/>
                   </a:solidFill>
@@ -1467,7 +1472,7 @@
             </a:ln>
             <a:extLst>
               <a:ext uri="{91240B29-F687-4f45-9708-019B960494DF}">
-                <a14:hiddenLine xmlns:a14="http://schemas.microsoft.com/office/drawing/2010/main" xmlns="" w="9525">
+                <a14:hiddenLine xmlns="" xmlns:a14="http://schemas.microsoft.com/office/drawing/2010/main" w="9525">
                   <a:solidFill>
                     <a:srgbClr val="000000"/>
                   </a:solidFill>
@@ -1529,7 +1534,7 @@
             </a:ln>
             <a:extLst>
               <a:ext uri="{91240B29-F687-4f45-9708-019B960494DF}">
-                <a14:hiddenLine xmlns:a14="http://schemas.microsoft.com/office/drawing/2010/main" xmlns="" w="9525">
+                <a14:hiddenLine xmlns="" xmlns:a14="http://schemas.microsoft.com/office/drawing/2010/main" w="9525">
                   <a:solidFill>
                     <a:srgbClr val="000000"/>
                   </a:solidFill>
@@ -1619,7 +1624,7 @@
             </a:ln>
             <a:extLst>
               <a:ext uri="{91240B29-F687-4f45-9708-019B960494DF}">
-                <a14:hiddenLine xmlns:a14="http://schemas.microsoft.com/office/drawing/2010/main" xmlns="" w="9525">
+                <a14:hiddenLine xmlns="" xmlns:a14="http://schemas.microsoft.com/office/drawing/2010/main" w="9525">
                   <a:solidFill>
                     <a:srgbClr val="000000"/>
                   </a:solidFill>
@@ -1709,7 +1714,7 @@
             </a:ln>
             <a:extLst>
               <a:ext uri="{91240B29-F687-4f45-9708-019B960494DF}">
-                <a14:hiddenLine xmlns:a14="http://schemas.microsoft.com/office/drawing/2010/main" xmlns="" w="9525">
+                <a14:hiddenLine xmlns="" xmlns:a14="http://schemas.microsoft.com/office/drawing/2010/main" w="9525">
                   <a:solidFill>
                     <a:srgbClr val="000000"/>
                   </a:solidFill>
@@ -1765,7 +1770,7 @@
             </a:ln>
             <a:extLst>
               <a:ext uri="{91240B29-F687-4f45-9708-019B960494DF}">
-                <a14:hiddenLine xmlns:a14="http://schemas.microsoft.com/office/drawing/2010/main" xmlns="" w="9525">
+                <a14:hiddenLine xmlns="" xmlns:a14="http://schemas.microsoft.com/office/drawing/2010/main" w="9525">
                   <a:solidFill>
                     <a:srgbClr val="000000"/>
                   </a:solidFill>
@@ -1855,7 +1860,7 @@
             </a:ln>
             <a:extLst>
               <a:ext uri="{91240B29-F687-4f45-9708-019B960494DF}">
-                <a14:hiddenLine xmlns:a14="http://schemas.microsoft.com/office/drawing/2010/main" xmlns="" w="9525">
+                <a14:hiddenLine xmlns="" xmlns:a14="http://schemas.microsoft.com/office/drawing/2010/main" w="9525">
                   <a:solidFill>
                     <a:srgbClr val="000000"/>
                   </a:solidFill>
@@ -1911,7 +1916,7 @@
             </a:ln>
             <a:extLst>
               <a:ext uri="{91240B29-F687-4f45-9708-019B960494DF}">
-                <a14:hiddenLine xmlns:a14="http://schemas.microsoft.com/office/drawing/2010/main" xmlns="" w="9525">
+                <a14:hiddenLine xmlns="" xmlns:a14="http://schemas.microsoft.com/office/drawing/2010/main" w="9525">
                   <a:solidFill>
                     <a:srgbClr val="000000"/>
                   </a:solidFill>
@@ -2001,7 +2006,7 @@
             </a:ln>
             <a:extLst>
               <a:ext uri="{91240B29-F687-4f45-9708-019B960494DF}">
-                <a14:hiddenLine xmlns:a14="http://schemas.microsoft.com/office/drawing/2010/main" xmlns="" w="9525">
+                <a14:hiddenLine xmlns="" xmlns:a14="http://schemas.microsoft.com/office/drawing/2010/main" w="9525">
                   <a:solidFill>
                     <a:srgbClr val="000000"/>
                   </a:solidFill>
@@ -2069,7 +2074,7 @@
             </a:ln>
             <a:extLst>
               <a:ext uri="{91240B29-F687-4f45-9708-019B960494DF}">
-                <a14:hiddenLine xmlns:a14="http://schemas.microsoft.com/office/drawing/2010/main" xmlns="" w="9525">
+                <a14:hiddenLine xmlns="" xmlns:a14="http://schemas.microsoft.com/office/drawing/2010/main" w="9525">
                   <a:solidFill>
                     <a:srgbClr val="000000"/>
                   </a:solidFill>
@@ -2159,7 +2164,7 @@
             </a:ln>
             <a:extLst>
               <a:ext uri="{91240B29-F687-4f45-9708-019B960494DF}">
-                <a14:hiddenLine xmlns:a14="http://schemas.microsoft.com/office/drawing/2010/main" xmlns="" w="9525">
+                <a14:hiddenLine xmlns="" xmlns:a14="http://schemas.microsoft.com/office/drawing/2010/main" w="9525">
                   <a:solidFill>
                     <a:srgbClr val="000000"/>
                   </a:solidFill>
@@ -2227,7 +2232,7 @@
             </a:ln>
             <a:extLst>
               <a:ext uri="{91240B29-F687-4f45-9708-019B960494DF}">
-                <a14:hiddenLine xmlns:a14="http://schemas.microsoft.com/office/drawing/2010/main" xmlns="" w="9525">
+                <a14:hiddenLine xmlns="" xmlns:a14="http://schemas.microsoft.com/office/drawing/2010/main" w="9525">
                   <a:solidFill>
                     <a:srgbClr val="000000"/>
                   </a:solidFill>
@@ -2317,7 +2322,7 @@
             </a:ln>
             <a:extLst>
               <a:ext uri="{91240B29-F687-4f45-9708-019B960494DF}">
-                <a14:hiddenLine xmlns:a14="http://schemas.microsoft.com/office/drawing/2010/main" xmlns="" w="9525">
+                <a14:hiddenLine xmlns="" xmlns:a14="http://schemas.microsoft.com/office/drawing/2010/main" w="9525">
                   <a:solidFill>
                     <a:srgbClr val="000000"/>
                   </a:solidFill>
@@ -2351,7 +2356,7 @@
             </a:ln>
             <a:extLst>
               <a:ext uri="{91240B29-F687-4f45-9708-019B960494DF}">
-                <a14:hiddenLine xmlns:a14="http://schemas.microsoft.com/office/drawing/2010/main" xmlns="" w="9525">
+                <a14:hiddenLine xmlns="" xmlns:a14="http://schemas.microsoft.com/office/drawing/2010/main" w="9525">
                   <a:solidFill>
                     <a:srgbClr val="000000"/>
                   </a:solidFill>
@@ -2441,7 +2446,7 @@
             </a:ln>
             <a:extLst>
               <a:ext uri="{91240B29-F687-4f45-9708-019B960494DF}">
-                <a14:hiddenLine xmlns:a14="http://schemas.microsoft.com/office/drawing/2010/main" xmlns="" w="9525">
+                <a14:hiddenLine xmlns="" xmlns:a14="http://schemas.microsoft.com/office/drawing/2010/main" w="9525">
                   <a:solidFill>
                     <a:srgbClr val="000000"/>
                   </a:solidFill>
@@ -2503,7 +2508,7 @@
             </a:ln>
             <a:extLst>
               <a:ext uri="{91240B29-F687-4f45-9708-019B960494DF}">
-                <a14:hiddenLine xmlns:a14="http://schemas.microsoft.com/office/drawing/2010/main" xmlns="" w="9525">
+                <a14:hiddenLine xmlns="" xmlns:a14="http://schemas.microsoft.com/office/drawing/2010/main" w="9525">
                   <a:solidFill>
                     <a:srgbClr val="000000"/>
                   </a:solidFill>
@@ -2565,7 +2570,7 @@
             </a:ln>
             <a:extLst>
               <a:ext uri="{91240B29-F687-4f45-9708-019B960494DF}">
-                <a14:hiddenLine xmlns:a14="http://schemas.microsoft.com/office/drawing/2010/main" xmlns="" w="9525">
+                <a14:hiddenLine xmlns="" xmlns:a14="http://schemas.microsoft.com/office/drawing/2010/main" w="9525">
                   <a:solidFill>
                     <a:srgbClr val="000000"/>
                   </a:solidFill>
@@ -2655,7 +2660,7 @@
             </a:ln>
             <a:extLst>
               <a:ext uri="{91240B29-F687-4f45-9708-019B960494DF}">
-                <a14:hiddenLine xmlns:a14="http://schemas.microsoft.com/office/drawing/2010/main" xmlns="" w="9525">
+                <a14:hiddenLine xmlns="" xmlns:a14="http://schemas.microsoft.com/office/drawing/2010/main" w="9525">
                   <a:solidFill>
                     <a:srgbClr val="000000"/>
                   </a:solidFill>
@@ -2723,7 +2728,7 @@
             </a:ln>
             <a:extLst>
               <a:ext uri="{91240B29-F687-4f45-9708-019B960494DF}">
-                <a14:hiddenLine xmlns:a14="http://schemas.microsoft.com/office/drawing/2010/main" xmlns="" w="9525">
+                <a14:hiddenLine xmlns="" xmlns:a14="http://schemas.microsoft.com/office/drawing/2010/main" w="9525">
                   <a:solidFill>
                     <a:srgbClr val="000000"/>
                   </a:solidFill>
@@ -2785,7 +2790,7 @@
             </a:ln>
             <a:extLst>
               <a:ext uri="{91240B29-F687-4f45-9708-019B960494DF}">
-                <a14:hiddenLine xmlns:a14="http://schemas.microsoft.com/office/drawing/2010/main" xmlns="" w="9525">
+                <a14:hiddenLine xmlns="" xmlns:a14="http://schemas.microsoft.com/office/drawing/2010/main" w="9525">
                   <a:solidFill>
                     <a:srgbClr val="000000"/>
                   </a:solidFill>
@@ -2875,7 +2880,7 @@
             </a:ln>
             <a:extLst>
               <a:ext uri="{91240B29-F687-4f45-9708-019B960494DF}">
-                <a14:hiddenLine xmlns:a14="http://schemas.microsoft.com/office/drawing/2010/main" xmlns="" w="9525">
+                <a14:hiddenLine xmlns="" xmlns:a14="http://schemas.microsoft.com/office/drawing/2010/main" w="9525">
                   <a:solidFill>
                     <a:srgbClr val="000000"/>
                   </a:solidFill>
@@ -2937,7 +2942,7 @@
             </a:ln>
             <a:extLst>
               <a:ext uri="{91240B29-F687-4f45-9708-019B960494DF}">
-                <a14:hiddenLine xmlns:a14="http://schemas.microsoft.com/office/drawing/2010/main" xmlns="" w="9525">
+                <a14:hiddenLine xmlns="" xmlns:a14="http://schemas.microsoft.com/office/drawing/2010/main" w="9525">
                   <a:solidFill>
                     <a:srgbClr val="000000"/>
                   </a:solidFill>
@@ -3027,7 +3032,7 @@
             </a:ln>
             <a:extLst>
               <a:ext uri="{91240B29-F687-4f45-9708-019B960494DF}">
-                <a14:hiddenLine xmlns:a14="http://schemas.microsoft.com/office/drawing/2010/main" xmlns="" w="9525">
+                <a14:hiddenLine xmlns="" xmlns:a14="http://schemas.microsoft.com/office/drawing/2010/main" w="9525">
                   <a:solidFill>
                     <a:srgbClr val="000000"/>
                   </a:solidFill>
@@ -3089,7 +3094,7 @@
             </a:ln>
             <a:extLst>
               <a:ext uri="{91240B29-F687-4f45-9708-019B960494DF}">
-                <a14:hiddenLine xmlns:a14="http://schemas.microsoft.com/office/drawing/2010/main" xmlns="" w="9525">
+                <a14:hiddenLine xmlns="" xmlns:a14="http://schemas.microsoft.com/office/drawing/2010/main" w="9525">
                   <a:solidFill>
                     <a:srgbClr val="000000"/>
                   </a:solidFill>
@@ -3179,7 +3184,7 @@
             </a:ln>
             <a:extLst>
               <a:ext uri="{91240B29-F687-4f45-9708-019B960494DF}">
-                <a14:hiddenLine xmlns:a14="http://schemas.microsoft.com/office/drawing/2010/main" xmlns="" w="9525">
+                <a14:hiddenLine xmlns="" xmlns:a14="http://schemas.microsoft.com/office/drawing/2010/main" w="9525">
                   <a:solidFill>
                     <a:srgbClr val="000000"/>
                   </a:solidFill>
@@ -3213,7 +3218,7 @@
             </a:ln>
             <a:extLst>
               <a:ext uri="{91240B29-F687-4f45-9708-019B960494DF}">
-                <a14:hiddenLine xmlns:a14="http://schemas.microsoft.com/office/drawing/2010/main" xmlns="" w="9525">
+                <a14:hiddenLine xmlns="" xmlns:a14="http://schemas.microsoft.com/office/drawing/2010/main" w="9525">
                   <a:solidFill>
                     <a:srgbClr val="000000"/>
                   </a:solidFill>
@@ -3278,7 +3283,7 @@
             </a:ln>
             <a:extLst>
               <a:ext uri="{91240B29-F687-4f45-9708-019B960494DF}">
-                <a14:hiddenLine xmlns:a14="http://schemas.microsoft.com/office/drawing/2010/main" xmlns="" w="9525">
+                <a14:hiddenLine xmlns="" xmlns:a14="http://schemas.microsoft.com/office/drawing/2010/main" w="9525">
                   <a:solidFill>
                     <a:srgbClr val="000000"/>
                   </a:solidFill>
@@ -3368,7 +3373,7 @@
             </a:ln>
             <a:extLst>
               <a:ext uri="{91240B29-F687-4f45-9708-019B960494DF}">
-                <a14:hiddenLine xmlns:a14="http://schemas.microsoft.com/office/drawing/2010/main" xmlns="" w="9525">
+                <a14:hiddenLine xmlns="" xmlns:a14="http://schemas.microsoft.com/office/drawing/2010/main" w="9525">
                   <a:solidFill>
                     <a:srgbClr val="000000"/>
                   </a:solidFill>
@@ -3430,7 +3435,7 @@
             </a:ln>
             <a:extLst>
               <a:ext uri="{91240B29-F687-4f45-9708-019B960494DF}">
-                <a14:hiddenLine xmlns:a14="http://schemas.microsoft.com/office/drawing/2010/main" xmlns="" w="9525">
+                <a14:hiddenLine xmlns="" xmlns:a14="http://schemas.microsoft.com/office/drawing/2010/main" w="9525">
                   <a:solidFill>
                     <a:srgbClr val="000000"/>
                   </a:solidFill>
@@ -3520,7 +3525,7 @@
             </a:ln>
             <a:extLst>
               <a:ext uri="{91240B29-F687-4f45-9708-019B960494DF}">
-                <a14:hiddenLine xmlns:a14="http://schemas.microsoft.com/office/drawing/2010/main" xmlns="" w="9525">
+                <a14:hiddenLine xmlns="" xmlns:a14="http://schemas.microsoft.com/office/drawing/2010/main" w="9525">
                   <a:solidFill>
                     <a:srgbClr val="000000"/>
                   </a:solidFill>
@@ -3610,7 +3615,7 @@
             </a:ln>
             <a:extLst>
               <a:ext uri="{91240B29-F687-4f45-9708-019B960494DF}">
-                <a14:hiddenLine xmlns:a14="http://schemas.microsoft.com/office/drawing/2010/main" xmlns="" w="9525">
+                <a14:hiddenLine xmlns="" xmlns:a14="http://schemas.microsoft.com/office/drawing/2010/main" w="9525">
                   <a:solidFill>
                     <a:srgbClr val="000000"/>
                   </a:solidFill>
@@ -3675,7 +3680,7 @@
             </a:ln>
             <a:extLst>
               <a:ext uri="{91240B29-F687-4f45-9708-019B960494DF}">
-                <a14:hiddenLine xmlns:a14="http://schemas.microsoft.com/office/drawing/2010/main" xmlns="" w="9525">
+                <a14:hiddenLine xmlns="" xmlns:a14="http://schemas.microsoft.com/office/drawing/2010/main" w="9525">
                   <a:solidFill>
                     <a:srgbClr val="000000"/>
                   </a:solidFill>
@@ -3737,7 +3742,7 @@
             </a:ln>
             <a:extLst>
               <a:ext uri="{91240B29-F687-4f45-9708-019B960494DF}">
-                <a14:hiddenLine xmlns:a14="http://schemas.microsoft.com/office/drawing/2010/main" xmlns="" w="9525">
+                <a14:hiddenLine xmlns="" xmlns:a14="http://schemas.microsoft.com/office/drawing/2010/main" w="9525">
                   <a:solidFill>
                     <a:srgbClr val="000000"/>
                   </a:solidFill>
@@ -3827,7 +3832,7 @@
             </a:ln>
             <a:extLst>
               <a:ext uri="{91240B29-F687-4f45-9708-019B960494DF}">
-                <a14:hiddenLine xmlns:a14="http://schemas.microsoft.com/office/drawing/2010/main" xmlns="" w="9525">
+                <a14:hiddenLine xmlns="" xmlns:a14="http://schemas.microsoft.com/office/drawing/2010/main" w="9525">
                   <a:solidFill>
                     <a:srgbClr val="000000"/>
                   </a:solidFill>
@@ -3917,7 +3922,7 @@
             </a:ln>
             <a:extLst>
               <a:ext uri="{91240B29-F687-4f45-9708-019B960494DF}">
-                <a14:hiddenLine xmlns:a14="http://schemas.microsoft.com/office/drawing/2010/main" xmlns="" w="9525">
+                <a14:hiddenLine xmlns="" xmlns:a14="http://schemas.microsoft.com/office/drawing/2010/main" w="9525">
                   <a:solidFill>
                     <a:srgbClr val="000000"/>
                   </a:solidFill>
@@ -3979,7 +3984,7 @@
             </a:ln>
             <a:extLst>
               <a:ext uri="{91240B29-F687-4f45-9708-019B960494DF}">
-                <a14:hiddenLine xmlns:a14="http://schemas.microsoft.com/office/drawing/2010/main" xmlns="" w="9525">
+                <a14:hiddenLine xmlns="" xmlns:a14="http://schemas.microsoft.com/office/drawing/2010/main" w="9525">
                   <a:solidFill>
                     <a:srgbClr val="000000"/>
                   </a:solidFill>
@@ -4099,7 +4104,7 @@
             </a:ln>
             <a:extLst>
               <a:ext uri="{91240B29-F687-4f45-9708-019B960494DF}">
-                <a14:hiddenLine xmlns:a14="http://schemas.microsoft.com/office/drawing/2010/main" xmlns="" w="9525">
+                <a14:hiddenLine xmlns="" xmlns:a14="http://schemas.microsoft.com/office/drawing/2010/main" w="9525">
                   <a:solidFill>
                     <a:srgbClr val="000000"/>
                   </a:solidFill>
@@ -4167,7 +4172,7 @@
             </a:ln>
             <a:extLst>
               <a:ext uri="{91240B29-F687-4f45-9708-019B960494DF}">
-                <a14:hiddenLine xmlns:a14="http://schemas.microsoft.com/office/drawing/2010/main" xmlns="" w="9525">
+                <a14:hiddenLine xmlns="" xmlns:a14="http://schemas.microsoft.com/office/drawing/2010/main" w="9525">
                   <a:solidFill>
                     <a:srgbClr val="000000"/>
                   </a:solidFill>
@@ -4257,7 +4262,7 @@
             </a:ln>
             <a:extLst>
               <a:ext uri="{91240B29-F687-4f45-9708-019B960494DF}">
-                <a14:hiddenLine xmlns:a14="http://schemas.microsoft.com/office/drawing/2010/main" xmlns="" w="9525">
+                <a14:hiddenLine xmlns="" xmlns:a14="http://schemas.microsoft.com/office/drawing/2010/main" w="9525">
                   <a:solidFill>
                     <a:srgbClr val="000000"/>
                   </a:solidFill>
@@ -4397,7 +4402,7 @@
           <a:p>
             <a:fld id="{48A87A34-81AB-432B-8DAE-1953F412C126}" type="datetimeFigureOut">
               <a:rPr lang="en-US" dirty="0"/>
-              <a:t>12/3/2016</a:t>
+              <a:t>12/5/2016</a:t>
             </a:fld>
             <a:endParaRPr lang="en-US" dirty="0"/>
           </a:p>
@@ -4659,7 +4664,7 @@
           <a:p>
             <a:fld id="{48A87A34-81AB-432B-8DAE-1953F412C126}" type="datetimeFigureOut">
               <a:rPr lang="en-US" dirty="0"/>
-              <a:t>12/3/2016</a:t>
+              <a:t>12/5/2016</a:t>
             </a:fld>
             <a:endParaRPr lang="en-US" dirty="0"/>
           </a:p>
@@ -4850,7 +4855,7 @@
           <a:p>
             <a:fld id="{48A87A34-81AB-432B-8DAE-1953F412C126}" type="datetimeFigureOut">
               <a:rPr lang="en-US" dirty="0"/>
-              <a:t>12/3/2016</a:t>
+              <a:t>12/5/2016</a:t>
             </a:fld>
             <a:endParaRPr lang="en-US" dirty="0"/>
           </a:p>
@@ -5108,7 +5113,7 @@
           <a:p>
             <a:fld id="{48A87A34-81AB-432B-8DAE-1953F412C126}" type="datetimeFigureOut">
               <a:rPr lang="en-US" dirty="0"/>
-              <a:t>12/3/2016</a:t>
+              <a:t>12/5/2016</a:t>
             </a:fld>
             <a:endParaRPr lang="en-US" dirty="0"/>
           </a:p>
@@ -5537,7 +5542,7 @@
           <a:p>
             <a:fld id="{48A87A34-81AB-432B-8DAE-1953F412C126}" type="datetimeFigureOut">
               <a:rPr lang="en-US" dirty="0"/>
-              <a:t>12/3/2016</a:t>
+              <a:t>12/5/2016</a:t>
             </a:fld>
             <a:endParaRPr lang="en-US" dirty="0"/>
           </a:p>
@@ -6078,7 +6083,7 @@
           <a:p>
             <a:fld id="{48A87A34-81AB-432B-8DAE-1953F412C126}" type="datetimeFigureOut">
               <a:rPr lang="en-US" dirty="0"/>
-              <a:t>12/3/2016</a:t>
+              <a:t>12/5/2016</a:t>
             </a:fld>
             <a:endParaRPr lang="en-US" dirty="0"/>
           </a:p>
@@ -6793,7 +6798,7 @@
           <a:p>
             <a:fld id="{48A87A34-81AB-432B-8DAE-1953F412C126}" type="datetimeFigureOut">
               <a:rPr lang="en-US" dirty="0"/>
-              <a:t>12/3/2016</a:t>
+              <a:t>12/5/2016</a:t>
             </a:fld>
             <a:endParaRPr lang="en-US" dirty="0"/>
           </a:p>
@@ -6958,7 +6963,7 @@
           <a:p>
             <a:fld id="{48A87A34-81AB-432B-8DAE-1953F412C126}" type="datetimeFigureOut">
               <a:rPr lang="en-US" dirty="0"/>
-              <a:t>12/3/2016</a:t>
+              <a:t>12/5/2016</a:t>
             </a:fld>
             <a:endParaRPr lang="en-US" dirty="0"/>
           </a:p>
@@ -7133,7 +7138,7 @@
           <a:p>
             <a:fld id="{48A87A34-81AB-432B-8DAE-1953F412C126}" type="datetimeFigureOut">
               <a:rPr lang="en-US" dirty="0"/>
-              <a:t>12/3/2016</a:t>
+              <a:t>12/5/2016</a:t>
             </a:fld>
             <a:endParaRPr lang="en-US" dirty="0"/>
           </a:p>
@@ -7298,7 +7303,7 @@
           <a:p>
             <a:fld id="{48A87A34-81AB-432B-8DAE-1953F412C126}" type="datetimeFigureOut">
               <a:rPr lang="en-US" dirty="0"/>
-              <a:t>12/3/2016</a:t>
+              <a:t>12/5/2016</a:t>
             </a:fld>
             <a:endParaRPr lang="en-US" dirty="0"/>
           </a:p>
@@ -7543,7 +7548,7 @@
           <a:p>
             <a:fld id="{48A87A34-81AB-432B-8DAE-1953F412C126}" type="datetimeFigureOut">
               <a:rPr lang="en-US" dirty="0"/>
-              <a:t>12/3/2016</a:t>
+              <a:t>12/5/2016</a:t>
             </a:fld>
             <a:endParaRPr lang="en-US" dirty="0"/>
           </a:p>
@@ -7770,7 +7775,7 @@
           <a:p>
             <a:fld id="{48A87A34-81AB-432B-8DAE-1953F412C126}" type="datetimeFigureOut">
               <a:rPr lang="en-US" dirty="0"/>
-              <a:t>12/3/2016</a:t>
+              <a:t>12/5/2016</a:t>
             </a:fld>
             <a:endParaRPr lang="en-US" dirty="0"/>
           </a:p>
@@ -8146,7 +8151,7 @@
           <a:p>
             <a:fld id="{48A87A34-81AB-432B-8DAE-1953F412C126}" type="datetimeFigureOut">
               <a:rPr lang="en-US" dirty="0"/>
-              <a:t>12/3/2016</a:t>
+              <a:t>12/5/2016</a:t>
             </a:fld>
             <a:endParaRPr lang="en-US" dirty="0"/>
           </a:p>
@@ -8259,7 +8264,7 @@
           <a:p>
             <a:fld id="{48A87A34-81AB-432B-8DAE-1953F412C126}" type="datetimeFigureOut">
               <a:rPr lang="en-US" dirty="0"/>
-              <a:t>12/3/2016</a:t>
+              <a:t>12/5/2016</a:t>
             </a:fld>
             <a:endParaRPr lang="en-US" dirty="0"/>
           </a:p>
@@ -8349,7 +8354,7 @@
           <a:p>
             <a:fld id="{48A87A34-81AB-432B-8DAE-1953F412C126}" type="datetimeFigureOut">
               <a:rPr lang="en-US" dirty="0"/>
-              <a:t>12/3/2016</a:t>
+              <a:t>12/5/2016</a:t>
             </a:fld>
             <a:endParaRPr lang="en-US" dirty="0"/>
           </a:p>
@@ -8593,7 +8598,7 @@
           <a:p>
             <a:fld id="{48A87A34-81AB-432B-8DAE-1953F412C126}" type="datetimeFigureOut">
               <a:rPr lang="en-US" dirty="0"/>
-              <a:t>12/3/2016</a:t>
+              <a:t>12/5/2016</a:t>
             </a:fld>
             <a:endParaRPr lang="en-US" dirty="0"/>
           </a:p>
@@ -8868,7 +8873,7 @@
           <a:p>
             <a:fld id="{48A87A34-81AB-432B-8DAE-1953F412C126}" type="datetimeFigureOut">
               <a:rPr lang="en-US" dirty="0"/>
-              <a:t>12/3/2016</a:t>
+              <a:t>12/5/2016</a:t>
             </a:fld>
             <a:endParaRPr lang="en-US" dirty="0"/>
           </a:p>
@@ -8986,7 +8991,7 @@
           <a:noFill/>
           <a:extLst>
             <a:ext uri="{909E8E84-426E-40dd-AFC4-6F175D3DCCD1}">
-              <a14:hiddenFill xmlns:a14="http://schemas.microsoft.com/office/drawing/2010/main" xmlns="">
+              <a14:hiddenFill xmlns="" xmlns:a14="http://schemas.microsoft.com/office/drawing/2010/main">
                 <a:solidFill>
                   <a:srgbClr val="FFFFFF"/>
                 </a:solidFill>
@@ -9060,7 +9065,7 @@
               </a:ln>
               <a:extLst>
                 <a:ext uri="{91240B29-F687-4f45-9708-019B960494DF}">
-                  <a14:hiddenLine xmlns:a14="http://schemas.microsoft.com/office/drawing/2010/main" xmlns="" w="9525">
+                  <a14:hiddenLine xmlns="" xmlns:a14="http://schemas.microsoft.com/office/drawing/2010/main" w="9525">
                     <a:solidFill>
                       <a:srgbClr val="000000"/>
                     </a:solidFill>
@@ -9150,7 +9155,7 @@
               </a:ln>
               <a:extLst>
                 <a:ext uri="{91240B29-F687-4f45-9708-019B960494DF}">
-                  <a14:hiddenLine xmlns:a14="http://schemas.microsoft.com/office/drawing/2010/main" xmlns="" w="9525">
+                  <a14:hiddenLine xmlns="" xmlns:a14="http://schemas.microsoft.com/office/drawing/2010/main" w="9525">
                     <a:solidFill>
                       <a:srgbClr val="000000"/>
                     </a:solidFill>
@@ -9240,7 +9245,7 @@
               </a:ln>
               <a:extLst>
                 <a:ext uri="{91240B29-F687-4f45-9708-019B960494DF}">
-                  <a14:hiddenLine xmlns:a14="http://schemas.microsoft.com/office/drawing/2010/main" xmlns="" w="9525">
+                  <a14:hiddenLine xmlns="" xmlns:a14="http://schemas.microsoft.com/office/drawing/2010/main" w="9525">
                     <a:solidFill>
                       <a:srgbClr val="000000"/>
                     </a:solidFill>
@@ -9302,7 +9307,7 @@
               </a:ln>
               <a:extLst>
                 <a:ext uri="{91240B29-F687-4f45-9708-019B960494DF}">
-                  <a14:hiddenLine xmlns:a14="http://schemas.microsoft.com/office/drawing/2010/main" xmlns="" w="9525">
+                  <a14:hiddenLine xmlns="" xmlns:a14="http://schemas.microsoft.com/office/drawing/2010/main" w="9525">
                     <a:solidFill>
                       <a:srgbClr val="000000"/>
                     </a:solidFill>
@@ -9392,7 +9397,7 @@
               </a:ln>
               <a:extLst>
                 <a:ext uri="{91240B29-F687-4f45-9708-019B960494DF}">
-                  <a14:hiddenLine xmlns:a14="http://schemas.microsoft.com/office/drawing/2010/main" xmlns="" w="9525">
+                  <a14:hiddenLine xmlns="" xmlns:a14="http://schemas.microsoft.com/office/drawing/2010/main" w="9525">
                     <a:solidFill>
                       <a:srgbClr val="000000"/>
                     </a:solidFill>
@@ -9454,7 +9459,7 @@
               </a:ln>
               <a:extLst>
                 <a:ext uri="{91240B29-F687-4f45-9708-019B960494DF}">
-                  <a14:hiddenLine xmlns:a14="http://schemas.microsoft.com/office/drawing/2010/main" xmlns="" w="9525">
+                  <a14:hiddenLine xmlns="" xmlns:a14="http://schemas.microsoft.com/office/drawing/2010/main" w="9525">
                     <a:solidFill>
                       <a:srgbClr val="000000"/>
                     </a:solidFill>
@@ -9516,7 +9521,7 @@
               </a:ln>
               <a:extLst>
                 <a:ext uri="{91240B29-F687-4f45-9708-019B960494DF}">
-                  <a14:hiddenLine xmlns:a14="http://schemas.microsoft.com/office/drawing/2010/main" xmlns="" w="9525">
+                  <a14:hiddenLine xmlns="" xmlns:a14="http://schemas.microsoft.com/office/drawing/2010/main" w="9525">
                     <a:solidFill>
                       <a:srgbClr val="000000"/>
                     </a:solidFill>
@@ -9606,7 +9611,7 @@
               </a:ln>
               <a:extLst>
                 <a:ext uri="{91240B29-F687-4f45-9708-019B960494DF}">
-                  <a14:hiddenLine xmlns:a14="http://schemas.microsoft.com/office/drawing/2010/main" xmlns="" w="9525">
+                  <a14:hiddenLine xmlns="" xmlns:a14="http://schemas.microsoft.com/office/drawing/2010/main" w="9525">
                     <a:solidFill>
                       <a:srgbClr val="000000"/>
                     </a:solidFill>
@@ -9696,7 +9701,7 @@
               </a:ln>
               <a:extLst>
                 <a:ext uri="{91240B29-F687-4f45-9708-019B960494DF}">
-                  <a14:hiddenLine xmlns:a14="http://schemas.microsoft.com/office/drawing/2010/main" xmlns="" w="9525">
+                  <a14:hiddenLine xmlns="" xmlns:a14="http://schemas.microsoft.com/office/drawing/2010/main" w="9525">
                     <a:solidFill>
                       <a:srgbClr val="000000"/>
                     </a:solidFill>
@@ -9758,7 +9763,7 @@
               </a:ln>
               <a:extLst>
                 <a:ext uri="{91240B29-F687-4f45-9708-019B960494DF}">
-                  <a14:hiddenLine xmlns:a14="http://schemas.microsoft.com/office/drawing/2010/main" xmlns="" w="9525">
+                  <a14:hiddenLine xmlns="" xmlns:a14="http://schemas.microsoft.com/office/drawing/2010/main" w="9525">
                     <a:solidFill>
                       <a:srgbClr val="000000"/>
                     </a:solidFill>
@@ -9868,7 +9873,7 @@
               </a:ln>
               <a:extLst>
                 <a:ext uri="{91240B29-F687-4f45-9708-019B960494DF}">
-                  <a14:hiddenLine xmlns:a14="http://schemas.microsoft.com/office/drawing/2010/main" xmlns="" w="9525">
+                  <a14:hiddenLine xmlns="" xmlns:a14="http://schemas.microsoft.com/office/drawing/2010/main" w="9525">
                     <a:solidFill>
                       <a:srgbClr val="000000"/>
                     </a:solidFill>
@@ -9952,7 +9957,7 @@
               </a:ln>
               <a:extLst>
                 <a:ext uri="{91240B29-F687-4f45-9708-019B960494DF}">
-                  <a14:hiddenLine xmlns:a14="http://schemas.microsoft.com/office/drawing/2010/main" xmlns="" w="9525">
+                  <a14:hiddenLine xmlns="" xmlns:a14="http://schemas.microsoft.com/office/drawing/2010/main" w="9525">
                     <a:solidFill>
                       <a:srgbClr val="000000"/>
                     </a:solidFill>
@@ -10014,7 +10019,7 @@
               </a:ln>
               <a:extLst>
                 <a:ext uri="{91240B29-F687-4f45-9708-019B960494DF}">
-                  <a14:hiddenLine xmlns:a14="http://schemas.microsoft.com/office/drawing/2010/main" xmlns="" w="9525">
+                  <a14:hiddenLine xmlns="" xmlns:a14="http://schemas.microsoft.com/office/drawing/2010/main" w="9525">
                     <a:solidFill>
                       <a:srgbClr val="000000"/>
                     </a:solidFill>
@@ -10076,7 +10081,7 @@
               </a:ln>
               <a:extLst>
                 <a:ext uri="{91240B29-F687-4f45-9708-019B960494DF}">
-                  <a14:hiddenLine xmlns:a14="http://schemas.microsoft.com/office/drawing/2010/main" xmlns="" w="9525">
+                  <a14:hiddenLine xmlns="" xmlns:a14="http://schemas.microsoft.com/office/drawing/2010/main" w="9525">
                     <a:solidFill>
                       <a:srgbClr val="000000"/>
                     </a:solidFill>
@@ -10166,7 +10171,7 @@
               </a:ln>
               <a:extLst>
                 <a:ext uri="{91240B29-F687-4f45-9708-019B960494DF}">
-                  <a14:hiddenLine xmlns:a14="http://schemas.microsoft.com/office/drawing/2010/main" xmlns="" w="9525">
+                  <a14:hiddenLine xmlns="" xmlns:a14="http://schemas.microsoft.com/office/drawing/2010/main" w="9525">
                     <a:solidFill>
                       <a:srgbClr val="000000"/>
                     </a:solidFill>
@@ -10200,7 +10205,7 @@
               </a:ln>
               <a:extLst>
                 <a:ext uri="{91240B29-F687-4f45-9708-019B960494DF}">
-                  <a14:hiddenLine xmlns:a14="http://schemas.microsoft.com/office/drawing/2010/main" xmlns="" w="9525">
+                  <a14:hiddenLine xmlns="" xmlns:a14="http://schemas.microsoft.com/office/drawing/2010/main" w="9525">
                     <a:solidFill>
                       <a:srgbClr val="000000"/>
                     </a:solidFill>
@@ -10265,7 +10270,7 @@
               </a:ln>
               <a:extLst>
                 <a:ext uri="{91240B29-F687-4f45-9708-019B960494DF}">
-                  <a14:hiddenLine xmlns:a14="http://schemas.microsoft.com/office/drawing/2010/main" xmlns="" w="9525">
+                  <a14:hiddenLine xmlns="" xmlns:a14="http://schemas.microsoft.com/office/drawing/2010/main" w="9525">
                     <a:solidFill>
                       <a:srgbClr val="000000"/>
                     </a:solidFill>
@@ -10355,7 +10360,7 @@
               </a:ln>
               <a:extLst>
                 <a:ext uri="{91240B29-F687-4f45-9708-019B960494DF}">
-                  <a14:hiddenLine xmlns:a14="http://schemas.microsoft.com/office/drawing/2010/main" xmlns="" w="9525">
+                  <a14:hiddenLine xmlns="" xmlns:a14="http://schemas.microsoft.com/office/drawing/2010/main" w="9525">
                     <a:solidFill>
                       <a:srgbClr val="000000"/>
                     </a:solidFill>
@@ -10417,7 +10422,7 @@
               </a:ln>
               <a:extLst>
                 <a:ext uri="{91240B29-F687-4f45-9708-019B960494DF}">
-                  <a14:hiddenLine xmlns:a14="http://schemas.microsoft.com/office/drawing/2010/main" xmlns="" w="9525">
+                  <a14:hiddenLine xmlns="" xmlns:a14="http://schemas.microsoft.com/office/drawing/2010/main" w="9525">
                     <a:solidFill>
                       <a:srgbClr val="000000"/>
                     </a:solidFill>
@@ -10507,7 +10512,7 @@
               </a:ln>
               <a:extLst>
                 <a:ext uri="{91240B29-F687-4f45-9708-019B960494DF}">
-                  <a14:hiddenLine xmlns:a14="http://schemas.microsoft.com/office/drawing/2010/main" xmlns="" w="9525">
+                  <a14:hiddenLine xmlns="" xmlns:a14="http://schemas.microsoft.com/office/drawing/2010/main" w="9525">
                     <a:solidFill>
                       <a:srgbClr val="000000"/>
                     </a:solidFill>
@@ -10572,7 +10577,7 @@
               </a:ln>
               <a:extLst>
                 <a:ext uri="{91240B29-F687-4f45-9708-019B960494DF}">
-                  <a14:hiddenLine xmlns:a14="http://schemas.microsoft.com/office/drawing/2010/main" xmlns="" w="9525">
+                  <a14:hiddenLine xmlns="" xmlns:a14="http://schemas.microsoft.com/office/drawing/2010/main" w="9525">
                     <a:solidFill>
                       <a:srgbClr val="000000"/>
                     </a:solidFill>
@@ -10634,7 +10639,7 @@
               </a:ln>
               <a:extLst>
                 <a:ext uri="{91240B29-F687-4f45-9708-019B960494DF}">
-                  <a14:hiddenLine xmlns:a14="http://schemas.microsoft.com/office/drawing/2010/main" xmlns="" w="9525">
+                  <a14:hiddenLine xmlns="" xmlns:a14="http://schemas.microsoft.com/office/drawing/2010/main" w="9525">
                     <a:solidFill>
                       <a:srgbClr val="000000"/>
                     </a:solidFill>
@@ -10724,7 +10729,7 @@
               </a:ln>
               <a:extLst>
                 <a:ext uri="{91240B29-F687-4f45-9708-019B960494DF}">
-                  <a14:hiddenLine xmlns:a14="http://schemas.microsoft.com/office/drawing/2010/main" xmlns="" w="9525">
+                  <a14:hiddenLine xmlns="" xmlns:a14="http://schemas.microsoft.com/office/drawing/2010/main" w="9525">
                     <a:solidFill>
                       <a:srgbClr val="000000"/>
                     </a:solidFill>
@@ -10814,7 +10819,7 @@
               </a:ln>
               <a:extLst>
                 <a:ext uri="{91240B29-F687-4f45-9708-019B960494DF}">
-                  <a14:hiddenLine xmlns:a14="http://schemas.microsoft.com/office/drawing/2010/main" xmlns="" w="9525">
+                  <a14:hiddenLine xmlns="" xmlns:a14="http://schemas.microsoft.com/office/drawing/2010/main" w="9525">
                     <a:solidFill>
                       <a:srgbClr val="000000"/>
                     </a:solidFill>
@@ -10879,7 +10884,7 @@
               </a:ln>
               <a:extLst>
                 <a:ext uri="{91240B29-F687-4f45-9708-019B960494DF}">
-                  <a14:hiddenLine xmlns:a14="http://schemas.microsoft.com/office/drawing/2010/main" xmlns="" w="9525">
+                  <a14:hiddenLine xmlns="" xmlns:a14="http://schemas.microsoft.com/office/drawing/2010/main" w="9525">
                     <a:solidFill>
                       <a:srgbClr val="000000"/>
                     </a:solidFill>
@@ -10999,7 +11004,7 @@
               </a:ln>
               <a:extLst>
                 <a:ext uri="{91240B29-F687-4f45-9708-019B960494DF}">
-                  <a14:hiddenLine xmlns:a14="http://schemas.microsoft.com/office/drawing/2010/main" xmlns="" w="9525">
+                  <a14:hiddenLine xmlns="" xmlns:a14="http://schemas.microsoft.com/office/drawing/2010/main" w="9525">
                     <a:solidFill>
                       <a:srgbClr val="000000"/>
                     </a:solidFill>
@@ -11080,7 +11085,7 @@
               </a:ln>
               <a:extLst>
                 <a:ext uri="{91240B29-F687-4f45-9708-019B960494DF}">
-                  <a14:hiddenLine xmlns:a14="http://schemas.microsoft.com/office/drawing/2010/main" xmlns="" w="9525">
+                  <a14:hiddenLine xmlns="" xmlns:a14="http://schemas.microsoft.com/office/drawing/2010/main" w="9525">
                     <a:solidFill>
                       <a:srgbClr val="000000"/>
                     </a:solidFill>
@@ -11195,7 +11200,7 @@
               </a:ln>
               <a:extLst>
                 <a:ext uri="{91240B29-F687-4f45-9708-019B960494DF}">
-                  <a14:hiddenLine xmlns:a14="http://schemas.microsoft.com/office/drawing/2010/main" xmlns="" w="9525">
+                  <a14:hiddenLine xmlns="" xmlns:a14="http://schemas.microsoft.com/office/drawing/2010/main" w="9525">
                     <a:solidFill>
                       <a:srgbClr val="000000"/>
                     </a:solidFill>
@@ -11285,7 +11290,7 @@
               </a:ln>
               <a:extLst>
                 <a:ext uri="{91240B29-F687-4f45-9708-019B960494DF}">
-                  <a14:hiddenLine xmlns:a14="http://schemas.microsoft.com/office/drawing/2010/main" xmlns="" w="9525">
+                  <a14:hiddenLine xmlns="" xmlns:a14="http://schemas.microsoft.com/office/drawing/2010/main" w="9525">
                     <a:solidFill>
                       <a:srgbClr val="000000"/>
                     </a:solidFill>
@@ -11350,7 +11355,7 @@
               </a:ln>
               <a:extLst>
                 <a:ext uri="{91240B29-F687-4f45-9708-019B960494DF}">
-                  <a14:hiddenLine xmlns:a14="http://schemas.microsoft.com/office/drawing/2010/main" xmlns="" w="9525">
+                  <a14:hiddenLine xmlns="" xmlns:a14="http://schemas.microsoft.com/office/drawing/2010/main" w="9525">
                     <a:solidFill>
                       <a:srgbClr val="000000"/>
                     </a:solidFill>
@@ -11440,7 +11445,7 @@
               </a:ln>
               <a:extLst>
                 <a:ext uri="{91240B29-F687-4f45-9708-019B960494DF}">
-                  <a14:hiddenLine xmlns:a14="http://schemas.microsoft.com/office/drawing/2010/main" xmlns="" w="9525">
+                  <a14:hiddenLine xmlns="" xmlns:a14="http://schemas.microsoft.com/office/drawing/2010/main" w="9525">
                     <a:solidFill>
                       <a:srgbClr val="000000"/>
                     </a:solidFill>
@@ -11508,7 +11513,7 @@
               </a:ln>
               <a:extLst>
                 <a:ext uri="{91240B29-F687-4f45-9708-019B960494DF}">
-                  <a14:hiddenLine xmlns:a14="http://schemas.microsoft.com/office/drawing/2010/main" xmlns="" w="9525">
+                  <a14:hiddenLine xmlns="" xmlns:a14="http://schemas.microsoft.com/office/drawing/2010/main" w="9525">
                     <a:solidFill>
                       <a:srgbClr val="000000"/>
                     </a:solidFill>
@@ -11598,7 +11603,7 @@
               </a:ln>
               <a:extLst>
                 <a:ext uri="{91240B29-F687-4f45-9708-019B960494DF}">
-                  <a14:hiddenLine xmlns:a14="http://schemas.microsoft.com/office/drawing/2010/main" xmlns="" w="9525">
+                  <a14:hiddenLine xmlns="" xmlns:a14="http://schemas.microsoft.com/office/drawing/2010/main" w="9525">
                     <a:solidFill>
                       <a:srgbClr val="000000"/>
                     </a:solidFill>
@@ -11666,7 +11671,7 @@
               </a:ln>
               <a:extLst>
                 <a:ext uri="{91240B29-F687-4f45-9708-019B960494DF}">
-                  <a14:hiddenLine xmlns:a14="http://schemas.microsoft.com/office/drawing/2010/main" xmlns="" w="9525">
+                  <a14:hiddenLine xmlns="" xmlns:a14="http://schemas.microsoft.com/office/drawing/2010/main" w="9525">
                     <a:solidFill>
                       <a:srgbClr val="000000"/>
                     </a:solidFill>
@@ -11756,7 +11761,7 @@
               </a:ln>
               <a:extLst>
                 <a:ext uri="{91240B29-F687-4f45-9708-019B960494DF}">
-                  <a14:hiddenLine xmlns:a14="http://schemas.microsoft.com/office/drawing/2010/main" xmlns="" w="9525">
+                  <a14:hiddenLine xmlns="" xmlns:a14="http://schemas.microsoft.com/office/drawing/2010/main" w="9525">
                     <a:solidFill>
                       <a:srgbClr val="000000"/>
                     </a:solidFill>
@@ -11790,7 +11795,7 @@
               </a:ln>
               <a:extLst>
                 <a:ext uri="{91240B29-F687-4f45-9708-019B960494DF}">
-                  <a14:hiddenLine xmlns:a14="http://schemas.microsoft.com/office/drawing/2010/main" xmlns="" w="9525">
+                  <a14:hiddenLine xmlns="" xmlns:a14="http://schemas.microsoft.com/office/drawing/2010/main" w="9525">
                     <a:solidFill>
                       <a:srgbClr val="000000"/>
                     </a:solidFill>
@@ -11931,7 +11936,7 @@
             <a:fld id="{48A87A34-81AB-432B-8DAE-1953F412C126}" type="datetimeFigureOut">
               <a:rPr lang="en-US" dirty="0"/>
               <a:pPr/>
-              <a:t>12/3/2016</a:t>
+              <a:t>12/5/2016</a:t>
             </a:fld>
             <a:endParaRPr lang="en-US" dirty="0"/>
           </a:p>
@@ -13105,7 +13110,7 @@
           <a:p>
             <a:r>
               <a:rPr lang="en-US" dirty="0"/>
-              <a:t>Cloud9 vs other platforms didn’t always behave the same way when rendering styling, so we had trouble nailing down exactly how we wanted the pages to look</a:t>
+              <a:t>Cloud9 vs other platforms didn’t always behave the same way when rendering styling, so we had trouble nailing down exactly how we wanted the pages to look.</a:t>
             </a:r>
           </a:p>
         </p:txBody>

</xml_diff>

<commit_message>
Final final update from me. Sorry about any weirdness just now, I had a SourceTree issue.
</commit_message>
<xml_diff>
--- a/Course project.pptx
+++ b/Course project.pptx
@@ -1,6 +1,6 @@
 
 <file path=ppt/presentation.xml><?xml version="1.0" encoding="utf-8"?>
-<p:presentation xmlns:a="http://schemas.openxmlformats.org/drawingml/2006/main" xmlns:r="http://schemas.openxmlformats.org/officeDocument/2006/relationships" xmlns:p="http://schemas.openxmlformats.org/presentationml/2006/main" autoCompressPictures="0">
+<p:presentation xmlns:a="http://schemas.openxmlformats.org/drawingml/2006/main" xmlns:r="http://schemas.openxmlformats.org/officeDocument/2006/relationships" xmlns:p="http://schemas.openxmlformats.org/presentationml/2006/main" saveSubsetFonts="1" autoCompressPictures="0">
   <p:sldMasterIdLst>
     <p:sldMasterId id="2147483648" r:id="rId1"/>
   </p:sldMasterIdLst>
@@ -112,6 +112,11 @@
       </a:defRPr>
     </a:lvl9pPr>
   </p:defaultTextStyle>
+  <p:extLst>
+    <p:ext uri="{EFAFB233-063F-42B5-8137-9DF3F51BA10A}">
+      <p15:sldGuideLst xmlns:p15="http://schemas.microsoft.com/office/powerpoint/2012/main"/>
+    </p:ext>
+  </p:extLst>
 </p:presentation>
 </file>
 
@@ -4397,7 +4402,7 @@
           <a:p>
             <a:fld id="{48A87A34-81AB-432B-8DAE-1953F412C126}" type="datetimeFigureOut">
               <a:rPr lang="en-US" dirty="0"/>
-              <a:t>12/3/2016</a:t>
+              <a:t>12/5/2016</a:t>
             </a:fld>
             <a:endParaRPr lang="en-US" dirty="0"/>
           </a:p>
@@ -4659,7 +4664,7 @@
           <a:p>
             <a:fld id="{48A87A34-81AB-432B-8DAE-1953F412C126}" type="datetimeFigureOut">
               <a:rPr lang="en-US" dirty="0"/>
-              <a:t>12/3/2016</a:t>
+              <a:t>12/5/2016</a:t>
             </a:fld>
             <a:endParaRPr lang="en-US" dirty="0"/>
           </a:p>
@@ -4850,7 +4855,7 @@
           <a:p>
             <a:fld id="{48A87A34-81AB-432B-8DAE-1953F412C126}" type="datetimeFigureOut">
               <a:rPr lang="en-US" dirty="0"/>
-              <a:t>12/3/2016</a:t>
+              <a:t>12/5/2016</a:t>
             </a:fld>
             <a:endParaRPr lang="en-US" dirty="0"/>
           </a:p>
@@ -5108,7 +5113,7 @@
           <a:p>
             <a:fld id="{48A87A34-81AB-432B-8DAE-1953F412C126}" type="datetimeFigureOut">
               <a:rPr lang="en-US" dirty="0"/>
-              <a:t>12/3/2016</a:t>
+              <a:t>12/5/2016</a:t>
             </a:fld>
             <a:endParaRPr lang="en-US" dirty="0"/>
           </a:p>
@@ -5537,7 +5542,7 @@
           <a:p>
             <a:fld id="{48A87A34-81AB-432B-8DAE-1953F412C126}" type="datetimeFigureOut">
               <a:rPr lang="en-US" dirty="0"/>
-              <a:t>12/3/2016</a:t>
+              <a:t>12/5/2016</a:t>
             </a:fld>
             <a:endParaRPr lang="en-US" dirty="0"/>
           </a:p>
@@ -6078,7 +6083,7 @@
           <a:p>
             <a:fld id="{48A87A34-81AB-432B-8DAE-1953F412C126}" type="datetimeFigureOut">
               <a:rPr lang="en-US" dirty="0"/>
-              <a:t>12/3/2016</a:t>
+              <a:t>12/5/2016</a:t>
             </a:fld>
             <a:endParaRPr lang="en-US" dirty="0"/>
           </a:p>
@@ -6793,7 +6798,7 @@
           <a:p>
             <a:fld id="{48A87A34-81AB-432B-8DAE-1953F412C126}" type="datetimeFigureOut">
               <a:rPr lang="en-US" dirty="0"/>
-              <a:t>12/3/2016</a:t>
+              <a:t>12/5/2016</a:t>
             </a:fld>
             <a:endParaRPr lang="en-US" dirty="0"/>
           </a:p>
@@ -6958,7 +6963,7 @@
           <a:p>
             <a:fld id="{48A87A34-81AB-432B-8DAE-1953F412C126}" type="datetimeFigureOut">
               <a:rPr lang="en-US" dirty="0"/>
-              <a:t>12/3/2016</a:t>
+              <a:t>12/5/2016</a:t>
             </a:fld>
             <a:endParaRPr lang="en-US" dirty="0"/>
           </a:p>
@@ -7133,7 +7138,7 @@
           <a:p>
             <a:fld id="{48A87A34-81AB-432B-8DAE-1953F412C126}" type="datetimeFigureOut">
               <a:rPr lang="en-US" dirty="0"/>
-              <a:t>12/3/2016</a:t>
+              <a:t>12/5/2016</a:t>
             </a:fld>
             <a:endParaRPr lang="en-US" dirty="0"/>
           </a:p>
@@ -7298,7 +7303,7 @@
           <a:p>
             <a:fld id="{48A87A34-81AB-432B-8DAE-1953F412C126}" type="datetimeFigureOut">
               <a:rPr lang="en-US" dirty="0"/>
-              <a:t>12/3/2016</a:t>
+              <a:t>12/5/2016</a:t>
             </a:fld>
             <a:endParaRPr lang="en-US" dirty="0"/>
           </a:p>
@@ -7543,7 +7548,7 @@
           <a:p>
             <a:fld id="{48A87A34-81AB-432B-8DAE-1953F412C126}" type="datetimeFigureOut">
               <a:rPr lang="en-US" dirty="0"/>
-              <a:t>12/3/2016</a:t>
+              <a:t>12/5/2016</a:t>
             </a:fld>
             <a:endParaRPr lang="en-US" dirty="0"/>
           </a:p>
@@ -7770,7 +7775,7 @@
           <a:p>
             <a:fld id="{48A87A34-81AB-432B-8DAE-1953F412C126}" type="datetimeFigureOut">
               <a:rPr lang="en-US" dirty="0"/>
-              <a:t>12/3/2016</a:t>
+              <a:t>12/5/2016</a:t>
             </a:fld>
             <a:endParaRPr lang="en-US" dirty="0"/>
           </a:p>
@@ -8146,7 +8151,7 @@
           <a:p>
             <a:fld id="{48A87A34-81AB-432B-8DAE-1953F412C126}" type="datetimeFigureOut">
               <a:rPr lang="en-US" dirty="0"/>
-              <a:t>12/3/2016</a:t>
+              <a:t>12/5/2016</a:t>
             </a:fld>
             <a:endParaRPr lang="en-US" dirty="0"/>
           </a:p>
@@ -8259,7 +8264,7 @@
           <a:p>
             <a:fld id="{48A87A34-81AB-432B-8DAE-1953F412C126}" type="datetimeFigureOut">
               <a:rPr lang="en-US" dirty="0"/>
-              <a:t>12/3/2016</a:t>
+              <a:t>12/5/2016</a:t>
             </a:fld>
             <a:endParaRPr lang="en-US" dirty="0"/>
           </a:p>
@@ -8349,7 +8354,7 @@
           <a:p>
             <a:fld id="{48A87A34-81AB-432B-8DAE-1953F412C126}" type="datetimeFigureOut">
               <a:rPr lang="en-US" dirty="0"/>
-              <a:t>12/3/2016</a:t>
+              <a:t>12/5/2016</a:t>
             </a:fld>
             <a:endParaRPr lang="en-US" dirty="0"/>
           </a:p>
@@ -8593,7 +8598,7 @@
           <a:p>
             <a:fld id="{48A87A34-81AB-432B-8DAE-1953F412C126}" type="datetimeFigureOut">
               <a:rPr lang="en-US" dirty="0"/>
-              <a:t>12/3/2016</a:t>
+              <a:t>12/5/2016</a:t>
             </a:fld>
             <a:endParaRPr lang="en-US" dirty="0"/>
           </a:p>
@@ -8868,7 +8873,7 @@
           <a:p>
             <a:fld id="{48A87A34-81AB-432B-8DAE-1953F412C126}" type="datetimeFigureOut">
               <a:rPr lang="en-US" dirty="0"/>
-              <a:t>12/3/2016</a:t>
+              <a:t>12/5/2016</a:t>
             </a:fld>
             <a:endParaRPr lang="en-US" dirty="0"/>
           </a:p>
@@ -11931,7 +11936,7 @@
             <a:fld id="{48A87A34-81AB-432B-8DAE-1953F412C126}" type="datetimeFigureOut">
               <a:rPr lang="en-US" dirty="0"/>
               <a:pPr/>
-              <a:t>12/3/2016</a:t>
+              <a:t>12/5/2016</a:t>
             </a:fld>
             <a:endParaRPr lang="en-US" dirty="0"/>
           </a:p>
@@ -12513,7 +12518,7 @@
           <a:p>
             <a:r>
               <a:rPr lang="en-US" dirty="0"/>
-              <a:t>Bootstrap CSS – for styling</a:t>
+              <a:t>Bootstrap CSS – for styling forms</a:t>
             </a:r>
           </a:p>
           <a:p>
@@ -13105,7 +13110,7 @@
           <a:p>
             <a:r>
               <a:rPr lang="en-US" dirty="0"/>
-              <a:t>Cloud9 vs other platforms didn’t always behave the same way when rendering styling, so we had trouble nailing down exactly how we wanted the pages to look</a:t>
+              <a:t>Cloud9 vs other platforms didn’t always behave the same way when rendering styling, so we had trouble nailing down exactly how we wanted the pages to look.</a:t>
             </a:r>
           </a:p>
         </p:txBody>
@@ -13197,12 +13202,8 @@
           </a:p>
           <a:p>
             <a:r>
-              <a:rPr lang="en-US" dirty="0" err="1"/>
-              <a:t>Mikah</a:t>
-            </a:r>
-            <a:r>
               <a:rPr lang="en-US" dirty="0"/>
-              <a:t>: Got us converted from basic CSS to Bootstrap, did the other few of the original pages shown at the midterm presentation.</a:t>
+              <a:t>Mikah: Applied Bootstrap to the form components, did the other few of the original webpages shown at the midterm presentation. Some front-end and the breadcrumbs.</a:t>
             </a:r>
           </a:p>
           <a:p>

</xml_diff>